<commit_message>
style: rework ppt rework slides font & styles
</commit_message>
<xml_diff>
--- a/docs/ppt/git_module_01.pptx
+++ b/docs/ppt/git_module_01.pptx
@@ -454,7 +454,7 @@
                 <a:latin typeface="Century Gothic" pitchFamily="34" charset="0"/>
               </a:rPr>
               <a:pPr/>
-              <a:t>23/12/2017</a:t>
+              <a:t>25/12/2017</a:t>
             </a:fld>
             <a:endParaRPr lang="fr-FR">
               <a:latin typeface="Century Gothic" pitchFamily="34" charset="0"/>
@@ -634,7 +634,7 @@
             <a:fld id="{FDCDEFE6-5B54-4838-86E6-97123BEF1300}" type="datetimeFigureOut">
               <a:rPr lang="fr-FR" smtClean="0"/>
               <a:pPr/>
-              <a:t>23/12/2017</a:t>
+              <a:t>25/12/2017</a:t>
             </a:fld>
             <a:endParaRPr lang="fr-FR"/>
           </a:p>
@@ -1997,7 +1997,6 @@
               <a:rPr lang="fr-FR" baseline="0" dirty="0" smtClean="0"/>
               <a:t> : git_module01_demo01</a:t>
             </a:r>
-            <a:endParaRPr lang="fr-FR" baseline="0" dirty="0" smtClean="0"/>
           </a:p>
           <a:p>
             <a:pPr marL="228600" indent="-228600">
@@ -5900,7 +5899,7 @@
           <a:lstStyle/>
           <a:p>
             <a:r>
-              <a:rPr lang="fr-FR"/>
+              <a:rPr lang="fr-FR" dirty="0"/>
               <a:t>Modifiez le style du titre</a:t>
             </a:r>
           </a:p>
@@ -6762,7 +6761,7 @@
           <a:lstStyle/>
           <a:p>
             <a:r>
-              <a:rPr lang="fr-FR"/>
+              <a:rPr lang="fr-FR" dirty="0"/>
               <a:t>Modifiez le style du titre</a:t>
             </a:r>
           </a:p>
@@ -6838,7 +6837,7 @@
           <a:p>
             <a:pPr lvl="0"/>
             <a:r>
-              <a:rPr lang="fr-FR"/>
+              <a:rPr lang="fr-FR" dirty="0"/>
               <a:t>Modifiez les styles du texte du masque</a:t>
             </a:r>
           </a:p>
@@ -8210,7 +8209,7 @@
           <a:graphicData uri="http://schemas.openxmlformats.org/presentationml/2006/ole">
             <mc:AlternateContent xmlns:mc="http://schemas.openxmlformats.org/markup-compatibility/2006">
               <mc:Choice xmlns:v="urn:schemas-microsoft-com:vml" Requires="v">
-                <p:oleObj spid="_x0000_s6561" name="Diapositive think-cell" r:id="rId6" imgW="270" imgH="270" progId="TCLayout.ActiveDocument.1">
+                <p:oleObj spid="_x0000_s6562" name="Diapositive think-cell" r:id="rId6" imgW="270" imgH="270" progId="TCLayout.ActiveDocument.1">
                   <p:embed/>
                 </p:oleObj>
               </mc:Choice>
@@ -8271,7 +8270,7 @@
           <a:lstStyle/>
           <a:p>
             <a:r>
-              <a:rPr lang="fr-FR"/>
+              <a:rPr lang="fr-FR" dirty="0"/>
               <a:t>Cliquez pour modifier le style du titre</a:t>
             </a:r>
           </a:p>
@@ -8952,7 +8951,7 @@
           <a:graphicData uri="http://schemas.openxmlformats.org/presentationml/2006/ole">
             <mc:AlternateContent xmlns:mc="http://schemas.openxmlformats.org/markup-compatibility/2006">
               <mc:Choice xmlns:v="urn:schemas-microsoft-com:vml" Requires="v">
-                <p:oleObj spid="_x0000_s6076" name="Diapositive think-cell" r:id="rId6" imgW="270" imgH="270" progId="TCLayout.ActiveDocument.1">
+                <p:oleObj spid="_x0000_s6077" name="Diapositive think-cell" r:id="rId6" imgW="270" imgH="270" progId="TCLayout.ActiveDocument.1">
                   <p:embed/>
                 </p:oleObj>
               </mc:Choice>
@@ -10305,7 +10304,7 @@
           <p:cNvPr id="2" name="Title 1">
             <a:extLst>
               <a:ext uri="{FF2B5EF4-FFF2-40B4-BE49-F238E27FC236}">
-                <a16:creationId xmlns="" xmlns:a16="http://schemas.microsoft.com/office/drawing/2014/main" id="{78456FD7-BB91-4376-9F54-57A4192F7D9C}"/>
+                <a16:creationId xmlns:a16="http://schemas.microsoft.com/office/drawing/2014/main" xmlns="" id="{78456FD7-BB91-4376-9F54-57A4192F7D9C}"/>
               </a:ext>
             </a:extLst>
           </p:cNvPr>
@@ -10338,7 +10337,7 @@
           <p:cNvPr id="3" name="Text Placeholder 2">
             <a:extLst>
               <a:ext uri="{FF2B5EF4-FFF2-40B4-BE49-F238E27FC236}">
-                <a16:creationId xmlns="" xmlns:a16="http://schemas.microsoft.com/office/drawing/2014/main" id="{352C0768-302F-4A6A-A9FF-BED7B68BC517}"/>
+                <a16:creationId xmlns:a16="http://schemas.microsoft.com/office/drawing/2014/main" xmlns="" id="{352C0768-302F-4A6A-A9FF-BED7B68BC517}"/>
               </a:ext>
             </a:extLst>
           </p:cNvPr>
@@ -10435,7 +10434,7 @@
           <p:cNvPr id="2" name="Text Placeholder 1">
             <a:extLst>
               <a:ext uri="{FF2B5EF4-FFF2-40B4-BE49-F238E27FC236}">
-                <a16:creationId xmlns="" xmlns:a16="http://schemas.microsoft.com/office/drawing/2014/main" id="{A51E6A0F-3D6D-493A-B24E-4199D72942C9}"/>
+                <a16:creationId xmlns:a16="http://schemas.microsoft.com/office/drawing/2014/main" xmlns="" id="{A51E6A0F-3D6D-493A-B24E-4199D72942C9}"/>
               </a:ext>
             </a:extLst>
           </p:cNvPr>
@@ -10460,7 +10459,7 @@
           <p:cNvPr id="3" name="Title 2">
             <a:extLst>
               <a:ext uri="{FF2B5EF4-FFF2-40B4-BE49-F238E27FC236}">
-                <a16:creationId xmlns="" xmlns:a16="http://schemas.microsoft.com/office/drawing/2014/main" id="{A8704E41-3486-46BD-8AA7-B6B5D28F95A5}"/>
+                <a16:creationId xmlns:a16="http://schemas.microsoft.com/office/drawing/2014/main" xmlns="" id="{A8704E41-3486-46BD-8AA7-B6B5D28F95A5}"/>
               </a:ext>
             </a:extLst>
           </p:cNvPr>
@@ -10497,7 +10496,7 @@
           <p:cNvPr id="4" name="Slide Number Placeholder 3">
             <a:extLst>
               <a:ext uri="{FF2B5EF4-FFF2-40B4-BE49-F238E27FC236}">
-                <a16:creationId xmlns="" xmlns:a16="http://schemas.microsoft.com/office/drawing/2014/main" id="{02CD92EA-E9CB-4F4C-B1B9-840F11B55DC5}"/>
+                <a16:creationId xmlns:a16="http://schemas.microsoft.com/office/drawing/2014/main" xmlns="" id="{02CD92EA-E9CB-4F4C-B1B9-840F11B55DC5}"/>
               </a:ext>
             </a:extLst>
           </p:cNvPr>
@@ -10543,7 +10542,7 @@
           <p:cNvPr id="5" name="Text Placeholder 4">
             <a:extLst>
               <a:ext uri="{FF2B5EF4-FFF2-40B4-BE49-F238E27FC236}">
-                <a16:creationId xmlns="" xmlns:a16="http://schemas.microsoft.com/office/drawing/2014/main" id="{C22D9F79-04C1-4762-96D6-F3FE8172F1B1}"/>
+                <a16:creationId xmlns:a16="http://schemas.microsoft.com/office/drawing/2014/main" xmlns="" id="{C22D9F79-04C1-4762-96D6-F3FE8172F1B1}"/>
               </a:ext>
             </a:extLst>
           </p:cNvPr>
@@ -10560,7 +10559,7 @@
           <a:lstStyle/>
           <a:p>
             <a:r>
-              <a:rPr lang="en-US" b="0" dirty="0"/>
+              <a:rPr lang="en-US" dirty="0"/>
               <a:t>…a Persistent Map</a:t>
             </a:r>
           </a:p>
@@ -10571,7 +10570,7 @@
           <p:cNvPr id="8" name="Picture 7">
             <a:extLst>
               <a:ext uri="{FF2B5EF4-FFF2-40B4-BE49-F238E27FC236}">
-                <a16:creationId xmlns="" xmlns:a16="http://schemas.microsoft.com/office/drawing/2014/main" id="{FEF76D80-A1A2-40D3-8D23-AD9AE057D7AB}"/>
+                <a16:creationId xmlns:a16="http://schemas.microsoft.com/office/drawing/2014/main" xmlns="" id="{FEF76D80-A1A2-40D3-8D23-AD9AE057D7AB}"/>
               </a:ext>
             </a:extLst>
           </p:cNvPr>
@@ -10653,7 +10652,7 @@
           <p:cNvPr id="3" name="Title 2">
             <a:extLst>
               <a:ext uri="{FF2B5EF4-FFF2-40B4-BE49-F238E27FC236}">
-                <a16:creationId xmlns="" xmlns:a16="http://schemas.microsoft.com/office/drawing/2014/main" id="{59A447FC-33B3-46B4-8460-A63ED4AF01B2}"/>
+                <a16:creationId xmlns:a16="http://schemas.microsoft.com/office/drawing/2014/main" xmlns="" id="{59A447FC-33B3-46B4-8460-A63ED4AF01B2}"/>
               </a:ext>
             </a:extLst>
           </p:cNvPr>
@@ -10682,7 +10681,7 @@
           <p:cNvPr id="4" name="Slide Number Placeholder 3">
             <a:extLst>
               <a:ext uri="{FF2B5EF4-FFF2-40B4-BE49-F238E27FC236}">
-                <a16:creationId xmlns="" xmlns:a16="http://schemas.microsoft.com/office/drawing/2014/main" id="{0CF510EC-D710-4D00-93D5-3B1CF0B1EAB6}"/>
+                <a16:creationId xmlns:a16="http://schemas.microsoft.com/office/drawing/2014/main" xmlns="" id="{0CF510EC-D710-4D00-93D5-3B1CF0B1EAB6}"/>
               </a:ext>
             </a:extLst>
           </p:cNvPr>
@@ -10728,7 +10727,7 @@
           <p:cNvPr id="5" name="Text Placeholder 4">
             <a:extLst>
               <a:ext uri="{FF2B5EF4-FFF2-40B4-BE49-F238E27FC236}">
-                <a16:creationId xmlns="" xmlns:a16="http://schemas.microsoft.com/office/drawing/2014/main" id="{CCED6746-9FE0-47A0-AC64-94ACD4CA9D3E}"/>
+                <a16:creationId xmlns:a16="http://schemas.microsoft.com/office/drawing/2014/main" xmlns="" id="{CCED6746-9FE0-47A0-AC64-94ACD4CA9D3E}"/>
               </a:ext>
             </a:extLst>
           </p:cNvPr>
@@ -10744,7 +10743,7 @@
           <a:bodyPr/>
           <a:lstStyle/>
           <a:p>
-            <a:endParaRPr lang="en-US"/>
+            <a:endParaRPr lang="en-US" dirty="0"/>
           </a:p>
         </p:txBody>
       </p:sp>
@@ -10753,7 +10752,7 @@
           <p:cNvPr id="6" name="TextBox 5">
             <a:extLst>
               <a:ext uri="{FF2B5EF4-FFF2-40B4-BE49-F238E27FC236}">
-                <a16:creationId xmlns="" xmlns:a16="http://schemas.microsoft.com/office/drawing/2014/main" id="{0EE63CE2-3370-4E7E-829F-A328E84D4A66}"/>
+                <a16:creationId xmlns:a16="http://schemas.microsoft.com/office/drawing/2014/main" xmlns="" id="{0EE63CE2-3370-4E7E-829F-A328E84D4A66}"/>
               </a:ext>
             </a:extLst>
           </p:cNvPr>
@@ -10817,7 +10816,7 @@
           <p:cNvPr id="7" name="TextBox 6">
             <a:extLst>
               <a:ext uri="{FF2B5EF4-FFF2-40B4-BE49-F238E27FC236}">
-                <a16:creationId xmlns="" xmlns:a16="http://schemas.microsoft.com/office/drawing/2014/main" id="{0FDA2B1A-9AA0-454F-A0E4-EC959F9E90E9}"/>
+                <a16:creationId xmlns:a16="http://schemas.microsoft.com/office/drawing/2014/main" xmlns="" id="{0FDA2B1A-9AA0-454F-A0E4-EC959F9E90E9}"/>
               </a:ext>
             </a:extLst>
           </p:cNvPr>
@@ -10860,7 +10859,7 @@
           <p:cNvPr id="9" name="Straight Arrow Connector 8">
             <a:extLst>
               <a:ext uri="{FF2B5EF4-FFF2-40B4-BE49-F238E27FC236}">
-                <a16:creationId xmlns="" xmlns:a16="http://schemas.microsoft.com/office/drawing/2014/main" id="{75364A1D-8566-4378-9A03-9B7D8A84C805}"/>
+                <a16:creationId xmlns:a16="http://schemas.microsoft.com/office/drawing/2014/main" xmlns="" id="{75364A1D-8566-4378-9A03-9B7D8A84C805}"/>
               </a:ext>
             </a:extLst>
           </p:cNvPr>
@@ -11039,7 +11038,7 @@
           <p:cNvPr id="3" name="Title 2">
             <a:extLst>
               <a:ext uri="{FF2B5EF4-FFF2-40B4-BE49-F238E27FC236}">
-                <a16:creationId xmlns="" xmlns:a16="http://schemas.microsoft.com/office/drawing/2014/main" id="{59A447FC-33B3-46B4-8460-A63ED4AF01B2}"/>
+                <a16:creationId xmlns:a16="http://schemas.microsoft.com/office/drawing/2014/main" xmlns="" id="{59A447FC-33B3-46B4-8460-A63ED4AF01B2}"/>
               </a:ext>
             </a:extLst>
           </p:cNvPr>
@@ -11068,7 +11067,7 @@
           <p:cNvPr id="4" name="Slide Number Placeholder 3">
             <a:extLst>
               <a:ext uri="{FF2B5EF4-FFF2-40B4-BE49-F238E27FC236}">
-                <a16:creationId xmlns="" xmlns:a16="http://schemas.microsoft.com/office/drawing/2014/main" id="{0CF510EC-D710-4D00-93D5-3B1CF0B1EAB6}"/>
+                <a16:creationId xmlns:a16="http://schemas.microsoft.com/office/drawing/2014/main" xmlns="" id="{0CF510EC-D710-4D00-93D5-3B1CF0B1EAB6}"/>
               </a:ext>
             </a:extLst>
           </p:cNvPr>
@@ -11114,7 +11113,7 @@
           <p:cNvPr id="5" name="Text Placeholder 4">
             <a:extLst>
               <a:ext uri="{FF2B5EF4-FFF2-40B4-BE49-F238E27FC236}">
-                <a16:creationId xmlns="" xmlns:a16="http://schemas.microsoft.com/office/drawing/2014/main" id="{CCED6746-9FE0-47A0-AC64-94ACD4CA9D3E}"/>
+                <a16:creationId xmlns:a16="http://schemas.microsoft.com/office/drawing/2014/main" xmlns="" id="{CCED6746-9FE0-47A0-AC64-94ACD4CA9D3E}"/>
               </a:ext>
             </a:extLst>
           </p:cNvPr>
@@ -11139,7 +11138,7 @@
           <p:cNvPr id="6" name="TextBox 5">
             <a:extLst>
               <a:ext uri="{FF2B5EF4-FFF2-40B4-BE49-F238E27FC236}">
-                <a16:creationId xmlns="" xmlns:a16="http://schemas.microsoft.com/office/drawing/2014/main" id="{0EE63CE2-3370-4E7E-829F-A328E84D4A66}"/>
+                <a16:creationId xmlns:a16="http://schemas.microsoft.com/office/drawing/2014/main" xmlns="" id="{0EE63CE2-3370-4E7E-829F-A328E84D4A66}"/>
               </a:ext>
             </a:extLst>
           </p:cNvPr>
@@ -11182,7 +11181,7 @@
           <p:cNvPr id="7" name="TextBox 6">
             <a:extLst>
               <a:ext uri="{FF2B5EF4-FFF2-40B4-BE49-F238E27FC236}">
-                <a16:creationId xmlns="" xmlns:a16="http://schemas.microsoft.com/office/drawing/2014/main" id="{0FDA2B1A-9AA0-454F-A0E4-EC959F9E90E9}"/>
+                <a16:creationId xmlns:a16="http://schemas.microsoft.com/office/drawing/2014/main" xmlns="" id="{0FDA2B1A-9AA0-454F-A0E4-EC959F9E90E9}"/>
               </a:ext>
             </a:extLst>
           </p:cNvPr>
@@ -11225,7 +11224,7 @@
           <p:cNvPr id="9" name="Straight Arrow Connector 8">
             <a:extLst>
               <a:ext uri="{FF2B5EF4-FFF2-40B4-BE49-F238E27FC236}">
-                <a16:creationId xmlns="" xmlns:a16="http://schemas.microsoft.com/office/drawing/2014/main" id="{75364A1D-8566-4378-9A03-9B7D8A84C805}"/>
+                <a16:creationId xmlns:a16="http://schemas.microsoft.com/office/drawing/2014/main" xmlns="" id="{75364A1D-8566-4378-9A03-9B7D8A84C805}"/>
               </a:ext>
             </a:extLst>
           </p:cNvPr>
@@ -11518,7 +11517,7 @@
           <p:cNvPr id="2" name="Title 1">
             <a:extLst>
               <a:ext uri="{FF2B5EF4-FFF2-40B4-BE49-F238E27FC236}">
-                <a16:creationId xmlns="" xmlns:a16="http://schemas.microsoft.com/office/drawing/2014/main" id="{C14F0455-9ED9-4652-8FD6-9C284BE2F092}"/>
+                <a16:creationId xmlns:a16="http://schemas.microsoft.com/office/drawing/2014/main" xmlns="" id="{C14F0455-9ED9-4652-8FD6-9C284BE2F092}"/>
               </a:ext>
             </a:extLst>
           </p:cNvPr>
@@ -11553,7 +11552,7 @@
           <p:cNvPr id="3" name="Text Placeholder 2">
             <a:extLst>
               <a:ext uri="{FF2B5EF4-FFF2-40B4-BE49-F238E27FC236}">
-                <a16:creationId xmlns="" xmlns:a16="http://schemas.microsoft.com/office/drawing/2014/main" id="{8136025E-6B8D-4575-9E2B-B0AAB8CAC233}"/>
+                <a16:creationId xmlns:a16="http://schemas.microsoft.com/office/drawing/2014/main" xmlns="" id="{8136025E-6B8D-4575-9E2B-B0AAB8CAC233}"/>
               </a:ext>
             </a:extLst>
           </p:cNvPr>
@@ -11618,7 +11617,7 @@
           <p:cNvPr id="3" name="Title 2">
             <a:extLst>
               <a:ext uri="{FF2B5EF4-FFF2-40B4-BE49-F238E27FC236}">
-                <a16:creationId xmlns="" xmlns:a16="http://schemas.microsoft.com/office/drawing/2014/main" id="{59A447FC-33B3-46B4-8460-A63ED4AF01B2}"/>
+                <a16:creationId xmlns:a16="http://schemas.microsoft.com/office/drawing/2014/main" xmlns="" id="{59A447FC-33B3-46B4-8460-A63ED4AF01B2}"/>
               </a:ext>
             </a:extLst>
           </p:cNvPr>
@@ -11647,7 +11646,7 @@
           <p:cNvPr id="4" name="Slide Number Placeholder 3">
             <a:extLst>
               <a:ext uri="{FF2B5EF4-FFF2-40B4-BE49-F238E27FC236}">
-                <a16:creationId xmlns="" xmlns:a16="http://schemas.microsoft.com/office/drawing/2014/main" id="{0CF510EC-D710-4D00-93D5-3B1CF0B1EAB6}"/>
+                <a16:creationId xmlns:a16="http://schemas.microsoft.com/office/drawing/2014/main" xmlns="" id="{0CF510EC-D710-4D00-93D5-3B1CF0B1EAB6}"/>
               </a:ext>
             </a:extLst>
           </p:cNvPr>
@@ -11693,7 +11692,7 @@
           <p:cNvPr id="5" name="Text Placeholder 4">
             <a:extLst>
               <a:ext uri="{FF2B5EF4-FFF2-40B4-BE49-F238E27FC236}">
-                <a16:creationId xmlns="" xmlns:a16="http://schemas.microsoft.com/office/drawing/2014/main" id="{CCED6746-9FE0-47A0-AC64-94ACD4CA9D3E}"/>
+                <a16:creationId xmlns:a16="http://schemas.microsoft.com/office/drawing/2014/main" xmlns="" id="{CCED6746-9FE0-47A0-AC64-94ACD4CA9D3E}"/>
               </a:ext>
             </a:extLst>
           </p:cNvPr>
@@ -11718,7 +11717,7 @@
           <p:cNvPr id="6" name="TextBox 5">
             <a:extLst>
               <a:ext uri="{FF2B5EF4-FFF2-40B4-BE49-F238E27FC236}">
-                <a16:creationId xmlns="" xmlns:a16="http://schemas.microsoft.com/office/drawing/2014/main" id="{0EE63CE2-3370-4E7E-829F-A328E84D4A66}"/>
+                <a16:creationId xmlns:a16="http://schemas.microsoft.com/office/drawing/2014/main" xmlns="" id="{0EE63CE2-3370-4E7E-829F-A328E84D4A66}"/>
               </a:ext>
             </a:extLst>
           </p:cNvPr>
@@ -11801,7 +11800,7 @@
           <p:cNvPr id="2" name="Title 1">
             <a:extLst>
               <a:ext uri="{FF2B5EF4-FFF2-40B4-BE49-F238E27FC236}">
-                <a16:creationId xmlns="" xmlns:a16="http://schemas.microsoft.com/office/drawing/2014/main" id="{C14F0455-9ED9-4652-8FD6-9C284BE2F092}"/>
+                <a16:creationId xmlns:a16="http://schemas.microsoft.com/office/drawing/2014/main" xmlns="" id="{C14F0455-9ED9-4652-8FD6-9C284BE2F092}"/>
               </a:ext>
             </a:extLst>
           </p:cNvPr>
@@ -11829,7 +11828,7 @@
           <p:cNvPr id="3" name="Text Placeholder 2">
             <a:extLst>
               <a:ext uri="{FF2B5EF4-FFF2-40B4-BE49-F238E27FC236}">
-                <a16:creationId xmlns="" xmlns:a16="http://schemas.microsoft.com/office/drawing/2014/main" id="{8136025E-6B8D-4575-9E2B-B0AAB8CAC233}"/>
+                <a16:creationId xmlns:a16="http://schemas.microsoft.com/office/drawing/2014/main" xmlns="" id="{8136025E-6B8D-4575-9E2B-B0AAB8CAC233}"/>
               </a:ext>
             </a:extLst>
           </p:cNvPr>
@@ -11894,7 +11893,7 @@
           <p:cNvPr id="2" name="Text Placeholder 1">
             <a:extLst>
               <a:ext uri="{FF2B5EF4-FFF2-40B4-BE49-F238E27FC236}">
-                <a16:creationId xmlns="" xmlns:a16="http://schemas.microsoft.com/office/drawing/2014/main" id="{A51E6A0F-3D6D-493A-B24E-4199D72942C9}"/>
+                <a16:creationId xmlns:a16="http://schemas.microsoft.com/office/drawing/2014/main" xmlns="" id="{A51E6A0F-3D6D-493A-B24E-4199D72942C9}"/>
               </a:ext>
             </a:extLst>
           </p:cNvPr>
@@ -11919,7 +11918,7 @@
           <p:cNvPr id="3" name="Title 2">
             <a:extLst>
               <a:ext uri="{FF2B5EF4-FFF2-40B4-BE49-F238E27FC236}">
-                <a16:creationId xmlns="" xmlns:a16="http://schemas.microsoft.com/office/drawing/2014/main" id="{A8704E41-3486-46BD-8AA7-B6B5D28F95A5}"/>
+                <a16:creationId xmlns:a16="http://schemas.microsoft.com/office/drawing/2014/main" xmlns="" id="{A8704E41-3486-46BD-8AA7-B6B5D28F95A5}"/>
               </a:ext>
             </a:extLst>
           </p:cNvPr>
@@ -11956,7 +11955,7 @@
           <p:cNvPr id="4" name="Slide Number Placeholder 3">
             <a:extLst>
               <a:ext uri="{FF2B5EF4-FFF2-40B4-BE49-F238E27FC236}">
-                <a16:creationId xmlns="" xmlns:a16="http://schemas.microsoft.com/office/drawing/2014/main" id="{02CD92EA-E9CB-4F4C-B1B9-840F11B55DC5}"/>
+                <a16:creationId xmlns:a16="http://schemas.microsoft.com/office/drawing/2014/main" xmlns="" id="{02CD92EA-E9CB-4F4C-B1B9-840F11B55DC5}"/>
               </a:ext>
             </a:extLst>
           </p:cNvPr>
@@ -12002,7 +12001,7 @@
           <p:cNvPr id="5" name="Text Placeholder 4">
             <a:extLst>
               <a:ext uri="{FF2B5EF4-FFF2-40B4-BE49-F238E27FC236}">
-                <a16:creationId xmlns="" xmlns:a16="http://schemas.microsoft.com/office/drawing/2014/main" id="{C22D9F79-04C1-4762-96D6-F3FE8172F1B1}"/>
+                <a16:creationId xmlns:a16="http://schemas.microsoft.com/office/drawing/2014/main" xmlns="" id="{C22D9F79-04C1-4762-96D6-F3FE8172F1B1}"/>
               </a:ext>
             </a:extLst>
           </p:cNvPr>
@@ -12019,7 +12018,7 @@
           <a:lstStyle/>
           <a:p>
             <a:r>
-              <a:rPr lang="en-US" b="0" dirty="0"/>
+              <a:rPr lang="en-US" dirty="0"/>
               <a:t>…a Persistent Map</a:t>
             </a:r>
           </a:p>
@@ -12030,7 +12029,7 @@
           <p:cNvPr id="8" name="Picture 7">
             <a:extLst>
               <a:ext uri="{FF2B5EF4-FFF2-40B4-BE49-F238E27FC236}">
-                <a16:creationId xmlns="" xmlns:a16="http://schemas.microsoft.com/office/drawing/2014/main" id="{FEF76D80-A1A2-40D3-8D23-AD9AE057D7AB}"/>
+                <a16:creationId xmlns:a16="http://schemas.microsoft.com/office/drawing/2014/main" xmlns="" id="{FEF76D80-A1A2-40D3-8D23-AD9AE057D7AB}"/>
               </a:ext>
             </a:extLst>
           </p:cNvPr>
@@ -12251,7 +12250,7 @@
           <p:cNvPr id="2" name="Text Placeholder 1">
             <a:extLst>
               <a:ext uri="{FF2B5EF4-FFF2-40B4-BE49-F238E27FC236}">
-                <a16:creationId xmlns="" xmlns:a16="http://schemas.microsoft.com/office/drawing/2014/main" id="{A51E6A0F-3D6D-493A-B24E-4199D72942C9}"/>
+                <a16:creationId xmlns:a16="http://schemas.microsoft.com/office/drawing/2014/main" xmlns="" id="{A51E6A0F-3D6D-493A-B24E-4199D72942C9}"/>
               </a:ext>
             </a:extLst>
           </p:cNvPr>
@@ -12276,7 +12275,7 @@
           <p:cNvPr id="3" name="Title 2">
             <a:extLst>
               <a:ext uri="{FF2B5EF4-FFF2-40B4-BE49-F238E27FC236}">
-                <a16:creationId xmlns="" xmlns:a16="http://schemas.microsoft.com/office/drawing/2014/main" id="{A8704E41-3486-46BD-8AA7-B6B5D28F95A5}"/>
+                <a16:creationId xmlns:a16="http://schemas.microsoft.com/office/drawing/2014/main" xmlns="" id="{A8704E41-3486-46BD-8AA7-B6B5D28F95A5}"/>
               </a:ext>
             </a:extLst>
           </p:cNvPr>
@@ -12313,7 +12312,7 @@
           <p:cNvPr id="4" name="Slide Number Placeholder 3">
             <a:extLst>
               <a:ext uri="{FF2B5EF4-FFF2-40B4-BE49-F238E27FC236}">
-                <a16:creationId xmlns="" xmlns:a16="http://schemas.microsoft.com/office/drawing/2014/main" id="{02CD92EA-E9CB-4F4C-B1B9-840F11B55DC5}"/>
+                <a16:creationId xmlns:a16="http://schemas.microsoft.com/office/drawing/2014/main" xmlns="" id="{02CD92EA-E9CB-4F4C-B1B9-840F11B55DC5}"/>
               </a:ext>
             </a:extLst>
           </p:cNvPr>
@@ -12359,7 +12358,7 @@
           <p:cNvPr id="5" name="Text Placeholder 4">
             <a:extLst>
               <a:ext uri="{FF2B5EF4-FFF2-40B4-BE49-F238E27FC236}">
-                <a16:creationId xmlns="" xmlns:a16="http://schemas.microsoft.com/office/drawing/2014/main" id="{C22D9F79-04C1-4762-96D6-F3FE8172F1B1}"/>
+                <a16:creationId xmlns:a16="http://schemas.microsoft.com/office/drawing/2014/main" xmlns="" id="{C22D9F79-04C1-4762-96D6-F3FE8172F1B1}"/>
               </a:ext>
             </a:extLst>
           </p:cNvPr>
@@ -12376,7 +12375,7 @@
           <a:lstStyle/>
           <a:p>
             <a:r>
-              <a:rPr lang="en-US" b="0" dirty="0"/>
+              <a:rPr lang="en-US" dirty="0"/>
               <a:t>…a Stupid Content Tracker</a:t>
             </a:r>
           </a:p>
@@ -12387,7 +12386,7 @@
           <p:cNvPr id="8" name="Picture 7">
             <a:extLst>
               <a:ext uri="{FF2B5EF4-FFF2-40B4-BE49-F238E27FC236}">
-                <a16:creationId xmlns="" xmlns:a16="http://schemas.microsoft.com/office/drawing/2014/main" id="{F11A34E2-CF14-4FAC-9913-4CAC796E46FA}"/>
+                <a16:creationId xmlns:a16="http://schemas.microsoft.com/office/drawing/2014/main" xmlns="" id="{F11A34E2-CF14-4FAC-9913-4CAC796E46FA}"/>
               </a:ext>
             </a:extLst>
           </p:cNvPr>
@@ -12608,7 +12607,7 @@
           <p:cNvPr id="103" name="Rectangle: Single Corner Snipped 53">
             <a:extLst>
               <a:ext uri="{FF2B5EF4-FFF2-40B4-BE49-F238E27FC236}">
-                <a16:creationId xmlns="" xmlns:a16="http://schemas.microsoft.com/office/drawing/2014/main" id="{7A50EE12-18BC-43CD-9927-59B1DBE1FF93}"/>
+                <a16:creationId xmlns:a16="http://schemas.microsoft.com/office/drawing/2014/main" xmlns="" id="{7A50EE12-18BC-43CD-9927-59B1DBE1FF93}"/>
               </a:ext>
             </a:extLst>
           </p:cNvPr>
@@ -12759,7 +12758,7 @@
           <p:cNvPr id="101" name="Rectangle: Single Corner Snipped 54">
             <a:extLst>
               <a:ext uri="{FF2B5EF4-FFF2-40B4-BE49-F238E27FC236}">
-                <a16:creationId xmlns="" xmlns:a16="http://schemas.microsoft.com/office/drawing/2014/main" id="{5DD2CB3A-1BD2-41AE-B00E-AF542B712862}"/>
+                <a16:creationId xmlns:a16="http://schemas.microsoft.com/office/drawing/2014/main" xmlns="" id="{5DD2CB3A-1BD2-41AE-B00E-AF542B712862}"/>
               </a:ext>
             </a:extLst>
           </p:cNvPr>
@@ -12840,7 +12839,7 @@
           <p:cNvPr id="3" name="Title 2">
             <a:extLst>
               <a:ext uri="{FF2B5EF4-FFF2-40B4-BE49-F238E27FC236}">
-                <a16:creationId xmlns="" xmlns:a16="http://schemas.microsoft.com/office/drawing/2014/main" id="{A8704E41-3486-46BD-8AA7-B6B5D28F95A5}"/>
+                <a16:creationId xmlns:a16="http://schemas.microsoft.com/office/drawing/2014/main" xmlns="" id="{A8704E41-3486-46BD-8AA7-B6B5D28F95A5}"/>
               </a:ext>
             </a:extLst>
           </p:cNvPr>
@@ -12873,7 +12872,7 @@
           <p:cNvPr id="4" name="Slide Number Placeholder 3">
             <a:extLst>
               <a:ext uri="{FF2B5EF4-FFF2-40B4-BE49-F238E27FC236}">
-                <a16:creationId xmlns="" xmlns:a16="http://schemas.microsoft.com/office/drawing/2014/main" id="{02CD92EA-E9CB-4F4C-B1B9-840F11B55DC5}"/>
+                <a16:creationId xmlns:a16="http://schemas.microsoft.com/office/drawing/2014/main" xmlns="" id="{02CD92EA-E9CB-4F4C-B1B9-840F11B55DC5}"/>
               </a:ext>
             </a:extLst>
           </p:cNvPr>
@@ -12919,7 +12918,7 @@
           <p:cNvPr id="5" name="Text Placeholder 4">
             <a:extLst>
               <a:ext uri="{FF2B5EF4-FFF2-40B4-BE49-F238E27FC236}">
-                <a16:creationId xmlns="" xmlns:a16="http://schemas.microsoft.com/office/drawing/2014/main" id="{C22D9F79-04C1-4762-96D6-F3FE8172F1B1}"/>
+                <a16:creationId xmlns:a16="http://schemas.microsoft.com/office/drawing/2014/main" xmlns="" id="{C22D9F79-04C1-4762-96D6-F3FE8172F1B1}"/>
               </a:ext>
             </a:extLst>
           </p:cNvPr>
@@ -12944,7 +12943,7 @@
           <p:cNvPr id="60" name="Oval 59">
             <a:extLst>
               <a:ext uri="{FF2B5EF4-FFF2-40B4-BE49-F238E27FC236}">
-                <a16:creationId xmlns="" xmlns:a16="http://schemas.microsoft.com/office/drawing/2014/main" id="{70018B8E-C8EA-4592-B666-4DD6915C2DAF}"/>
+                <a16:creationId xmlns:a16="http://schemas.microsoft.com/office/drawing/2014/main" xmlns="" id="{70018B8E-C8EA-4592-B666-4DD6915C2DAF}"/>
               </a:ext>
             </a:extLst>
           </p:cNvPr>
@@ -13000,7 +12999,7 @@
           <p:cNvPr id="61" name="Straight Arrow Connector 60">
             <a:extLst>
               <a:ext uri="{FF2B5EF4-FFF2-40B4-BE49-F238E27FC236}">
-                <a16:creationId xmlns="" xmlns:a16="http://schemas.microsoft.com/office/drawing/2014/main" id="{D5D1DDE3-D551-4E6B-AD34-6FBA1762CCD0}"/>
+                <a16:creationId xmlns:a16="http://schemas.microsoft.com/office/drawing/2014/main" xmlns="" id="{D5D1DDE3-D551-4E6B-AD34-6FBA1762CCD0}"/>
               </a:ext>
             </a:extLst>
           </p:cNvPr>
@@ -13044,7 +13043,7 @@
           <p:cNvPr id="62" name="TextBox 61">
             <a:extLst>
               <a:ext uri="{FF2B5EF4-FFF2-40B4-BE49-F238E27FC236}">
-                <a16:creationId xmlns="" xmlns:a16="http://schemas.microsoft.com/office/drawing/2014/main" id="{EA7F15EB-6AA1-4C76-921F-2B04B74B1885}"/>
+                <a16:creationId xmlns:a16="http://schemas.microsoft.com/office/drawing/2014/main" xmlns="" id="{EA7F15EB-6AA1-4C76-921F-2B04B74B1885}"/>
               </a:ext>
             </a:extLst>
           </p:cNvPr>
@@ -13086,7 +13085,7 @@
           <p:cNvPr id="63" name="Oval 62">
             <a:extLst>
               <a:ext uri="{FF2B5EF4-FFF2-40B4-BE49-F238E27FC236}">
-                <a16:creationId xmlns="" xmlns:a16="http://schemas.microsoft.com/office/drawing/2014/main" id="{70018B8E-C8EA-4592-B666-4DD6915C2DAF}"/>
+                <a16:creationId xmlns:a16="http://schemas.microsoft.com/office/drawing/2014/main" xmlns="" id="{70018B8E-C8EA-4592-B666-4DD6915C2DAF}"/>
               </a:ext>
             </a:extLst>
           </p:cNvPr>
@@ -13142,7 +13141,7 @@
           <p:cNvPr id="66" name="TextBox 65">
             <a:extLst>
               <a:ext uri="{FF2B5EF4-FFF2-40B4-BE49-F238E27FC236}">
-                <a16:creationId xmlns="" xmlns:a16="http://schemas.microsoft.com/office/drawing/2014/main" id="{EA7F15EB-6AA1-4C76-921F-2B04B74B1885}"/>
+                <a16:creationId xmlns:a16="http://schemas.microsoft.com/office/drawing/2014/main" xmlns="" id="{EA7F15EB-6AA1-4C76-921F-2B04B74B1885}"/>
               </a:ext>
             </a:extLst>
           </p:cNvPr>
@@ -13184,7 +13183,7 @@
           <p:cNvPr id="87" name="Oval 86">
             <a:extLst>
               <a:ext uri="{FF2B5EF4-FFF2-40B4-BE49-F238E27FC236}">
-                <a16:creationId xmlns="" xmlns:a16="http://schemas.microsoft.com/office/drawing/2014/main" id="{70018B8E-C8EA-4592-B666-4DD6915C2DAF}"/>
+                <a16:creationId xmlns:a16="http://schemas.microsoft.com/office/drawing/2014/main" xmlns="" id="{70018B8E-C8EA-4592-B666-4DD6915C2DAF}"/>
               </a:ext>
             </a:extLst>
           </p:cNvPr>
@@ -13240,7 +13239,7 @@
           <p:cNvPr id="88" name="Straight Arrow Connector 87">
             <a:extLst>
               <a:ext uri="{FF2B5EF4-FFF2-40B4-BE49-F238E27FC236}">
-                <a16:creationId xmlns="" xmlns:a16="http://schemas.microsoft.com/office/drawing/2014/main" id="{D5D1DDE3-D551-4E6B-AD34-6FBA1762CCD0}"/>
+                <a16:creationId xmlns:a16="http://schemas.microsoft.com/office/drawing/2014/main" xmlns="" id="{D5D1DDE3-D551-4E6B-AD34-6FBA1762CCD0}"/>
               </a:ext>
             </a:extLst>
           </p:cNvPr>
@@ -13284,7 +13283,7 @@
           <p:cNvPr id="89" name="TextBox 88">
             <a:extLst>
               <a:ext uri="{FF2B5EF4-FFF2-40B4-BE49-F238E27FC236}">
-                <a16:creationId xmlns="" xmlns:a16="http://schemas.microsoft.com/office/drawing/2014/main" id="{EA7F15EB-6AA1-4C76-921F-2B04B74B1885}"/>
+                <a16:creationId xmlns:a16="http://schemas.microsoft.com/office/drawing/2014/main" xmlns="" id="{EA7F15EB-6AA1-4C76-921F-2B04B74B1885}"/>
               </a:ext>
             </a:extLst>
           </p:cNvPr>
@@ -13326,7 +13325,7 @@
           <p:cNvPr id="91" name="Oval 90">
             <a:extLst>
               <a:ext uri="{FF2B5EF4-FFF2-40B4-BE49-F238E27FC236}">
-                <a16:creationId xmlns="" xmlns:a16="http://schemas.microsoft.com/office/drawing/2014/main" id="{70018B8E-C8EA-4592-B666-4DD6915C2DAF}"/>
+                <a16:creationId xmlns:a16="http://schemas.microsoft.com/office/drawing/2014/main" xmlns="" id="{70018B8E-C8EA-4592-B666-4DD6915C2DAF}"/>
               </a:ext>
             </a:extLst>
           </p:cNvPr>
@@ -13382,7 +13381,7 @@
           <p:cNvPr id="92" name="Straight Arrow Connector 91">
             <a:extLst>
               <a:ext uri="{FF2B5EF4-FFF2-40B4-BE49-F238E27FC236}">
-                <a16:creationId xmlns="" xmlns:a16="http://schemas.microsoft.com/office/drawing/2014/main" id="{D5D1DDE3-D551-4E6B-AD34-6FBA1762CCD0}"/>
+                <a16:creationId xmlns:a16="http://schemas.microsoft.com/office/drawing/2014/main" xmlns="" id="{D5D1DDE3-D551-4E6B-AD34-6FBA1762CCD0}"/>
               </a:ext>
             </a:extLst>
           </p:cNvPr>
@@ -13426,7 +13425,7 @@
           <p:cNvPr id="93" name="TextBox 92">
             <a:extLst>
               <a:ext uri="{FF2B5EF4-FFF2-40B4-BE49-F238E27FC236}">
-                <a16:creationId xmlns="" xmlns:a16="http://schemas.microsoft.com/office/drawing/2014/main" id="{EA7F15EB-6AA1-4C76-921F-2B04B74B1885}"/>
+                <a16:creationId xmlns:a16="http://schemas.microsoft.com/office/drawing/2014/main" xmlns="" id="{EA7F15EB-6AA1-4C76-921F-2B04B74B1885}"/>
               </a:ext>
             </a:extLst>
           </p:cNvPr>
@@ -13468,7 +13467,7 @@
           <p:cNvPr id="94" name="Oval 93">
             <a:extLst>
               <a:ext uri="{FF2B5EF4-FFF2-40B4-BE49-F238E27FC236}">
-                <a16:creationId xmlns="" xmlns:a16="http://schemas.microsoft.com/office/drawing/2014/main" id="{70018B8E-C8EA-4592-B666-4DD6915C2DAF}"/>
+                <a16:creationId xmlns:a16="http://schemas.microsoft.com/office/drawing/2014/main" xmlns="" id="{70018B8E-C8EA-4592-B666-4DD6915C2DAF}"/>
               </a:ext>
             </a:extLst>
           </p:cNvPr>
@@ -13524,7 +13523,7 @@
           <p:cNvPr id="95" name="TextBox 94">
             <a:extLst>
               <a:ext uri="{FF2B5EF4-FFF2-40B4-BE49-F238E27FC236}">
-                <a16:creationId xmlns="" xmlns:a16="http://schemas.microsoft.com/office/drawing/2014/main" id="{EA7F15EB-6AA1-4C76-921F-2B04B74B1885}"/>
+                <a16:creationId xmlns:a16="http://schemas.microsoft.com/office/drawing/2014/main" xmlns="" id="{EA7F15EB-6AA1-4C76-921F-2B04B74B1885}"/>
               </a:ext>
             </a:extLst>
           </p:cNvPr>
@@ -13566,7 +13565,7 @@
           <p:cNvPr id="97" name="TextBox 96">
             <a:extLst>
               <a:ext uri="{FF2B5EF4-FFF2-40B4-BE49-F238E27FC236}">
-                <a16:creationId xmlns="" xmlns:a16="http://schemas.microsoft.com/office/drawing/2014/main" id="{A3A739BC-7FC3-41A9-BB1E-19B55BC9B39C}"/>
+                <a16:creationId xmlns:a16="http://schemas.microsoft.com/office/drawing/2014/main" xmlns="" id="{A3A739BC-7FC3-41A9-BB1E-19B55BC9B39C}"/>
               </a:ext>
             </a:extLst>
           </p:cNvPr>
@@ -13619,7 +13618,7 @@
           <p:cNvPr id="98" name="Straight Arrow Connector 97">
             <a:extLst>
               <a:ext uri="{FF2B5EF4-FFF2-40B4-BE49-F238E27FC236}">
-                <a16:creationId xmlns="" xmlns:a16="http://schemas.microsoft.com/office/drawing/2014/main" id="{D5D1DDE3-D551-4E6B-AD34-6FBA1762CCD0}"/>
+                <a16:creationId xmlns:a16="http://schemas.microsoft.com/office/drawing/2014/main" xmlns="" id="{D5D1DDE3-D551-4E6B-AD34-6FBA1762CCD0}"/>
               </a:ext>
             </a:extLst>
           </p:cNvPr>
@@ -13663,7 +13662,7 @@
           <p:cNvPr id="100" name="Straight Arrow Connector 99">
             <a:extLst>
               <a:ext uri="{FF2B5EF4-FFF2-40B4-BE49-F238E27FC236}">
-                <a16:creationId xmlns="" xmlns:a16="http://schemas.microsoft.com/office/drawing/2014/main" id="{D5D1DDE3-D551-4E6B-AD34-6FBA1762CCD0}"/>
+                <a16:creationId xmlns:a16="http://schemas.microsoft.com/office/drawing/2014/main" xmlns="" id="{D5D1DDE3-D551-4E6B-AD34-6FBA1762CCD0}"/>
               </a:ext>
             </a:extLst>
           </p:cNvPr>
@@ -13707,7 +13706,7 @@
           <p:cNvPr id="102" name="TextBox 101">
             <a:extLst>
               <a:ext uri="{FF2B5EF4-FFF2-40B4-BE49-F238E27FC236}">
-                <a16:creationId xmlns="" xmlns:a16="http://schemas.microsoft.com/office/drawing/2014/main" id="{DCF44781-E941-421E-89BE-0ABCA37EDACB}"/>
+                <a16:creationId xmlns:a16="http://schemas.microsoft.com/office/drawing/2014/main" xmlns="" id="{DCF44781-E941-421E-89BE-0ABCA37EDACB}"/>
               </a:ext>
             </a:extLst>
           </p:cNvPr>
@@ -13760,7 +13759,7 @@
           <p:cNvPr id="105" name="TextBox 104">
             <a:extLst>
               <a:ext uri="{FF2B5EF4-FFF2-40B4-BE49-F238E27FC236}">
-                <a16:creationId xmlns="" xmlns:a16="http://schemas.microsoft.com/office/drawing/2014/main" id="{E2424417-DD1B-4E8D-A2A5-F034A489C27A}"/>
+                <a16:creationId xmlns:a16="http://schemas.microsoft.com/office/drawing/2014/main" xmlns="" id="{E2424417-DD1B-4E8D-A2A5-F034A489C27A}"/>
               </a:ext>
             </a:extLst>
           </p:cNvPr>
@@ -13813,7 +13812,7 @@
           <p:cNvPr id="106" name="TextBox 105">
             <a:extLst>
               <a:ext uri="{FF2B5EF4-FFF2-40B4-BE49-F238E27FC236}">
-                <a16:creationId xmlns="" xmlns:a16="http://schemas.microsoft.com/office/drawing/2014/main" id="{226BC8B6-2411-443E-BEE4-F24BDE166FA2}"/>
+                <a16:creationId xmlns:a16="http://schemas.microsoft.com/office/drawing/2014/main" xmlns="" id="{226BC8B6-2411-443E-BEE4-F24BDE166FA2}"/>
               </a:ext>
             </a:extLst>
           </p:cNvPr>
@@ -13866,7 +13865,7 @@
           <p:cNvPr id="107" name="TextBox 106">
             <a:extLst>
               <a:ext uri="{FF2B5EF4-FFF2-40B4-BE49-F238E27FC236}">
-                <a16:creationId xmlns="" xmlns:a16="http://schemas.microsoft.com/office/drawing/2014/main" id="{53330DED-8238-48AB-B79C-3155945E34EF}"/>
+                <a16:creationId xmlns:a16="http://schemas.microsoft.com/office/drawing/2014/main" xmlns="" id="{53330DED-8238-48AB-B79C-3155945E34EF}"/>
               </a:ext>
             </a:extLst>
           </p:cNvPr>
@@ -14532,7 +14531,7 @@
           <p:cNvPr id="109" name="Rectangle: Single Corner Snipped 39">
             <a:extLst>
               <a:ext uri="{FF2B5EF4-FFF2-40B4-BE49-F238E27FC236}">
-                <a16:creationId xmlns="" xmlns:a16="http://schemas.microsoft.com/office/drawing/2014/main" id="{331B82C4-A8A8-4CAA-9AD1-5A2312BDD52B}"/>
+                <a16:creationId xmlns:a16="http://schemas.microsoft.com/office/drawing/2014/main" xmlns="" id="{331B82C4-A8A8-4CAA-9AD1-5A2312BDD52B}"/>
               </a:ext>
             </a:extLst>
           </p:cNvPr>
@@ -14615,7 +14614,7 @@
           <p:cNvPr id="103" name="Rectangle: Single Corner Snipped 53">
             <a:extLst>
               <a:ext uri="{FF2B5EF4-FFF2-40B4-BE49-F238E27FC236}">
-                <a16:creationId xmlns="" xmlns:a16="http://schemas.microsoft.com/office/drawing/2014/main" id="{7A50EE12-18BC-43CD-9927-59B1DBE1FF93}"/>
+                <a16:creationId xmlns:a16="http://schemas.microsoft.com/office/drawing/2014/main" xmlns="" id="{7A50EE12-18BC-43CD-9927-59B1DBE1FF93}"/>
               </a:ext>
             </a:extLst>
           </p:cNvPr>
@@ -14766,7 +14765,7 @@
           <p:cNvPr id="101" name="Rectangle: Single Corner Snipped 54">
             <a:extLst>
               <a:ext uri="{FF2B5EF4-FFF2-40B4-BE49-F238E27FC236}">
-                <a16:creationId xmlns="" xmlns:a16="http://schemas.microsoft.com/office/drawing/2014/main" id="{5DD2CB3A-1BD2-41AE-B00E-AF542B712862}"/>
+                <a16:creationId xmlns:a16="http://schemas.microsoft.com/office/drawing/2014/main" xmlns="" id="{5DD2CB3A-1BD2-41AE-B00E-AF542B712862}"/>
               </a:ext>
             </a:extLst>
           </p:cNvPr>
@@ -14847,7 +14846,7 @@
           <p:cNvPr id="3" name="Title 2">
             <a:extLst>
               <a:ext uri="{FF2B5EF4-FFF2-40B4-BE49-F238E27FC236}">
-                <a16:creationId xmlns="" xmlns:a16="http://schemas.microsoft.com/office/drawing/2014/main" id="{A8704E41-3486-46BD-8AA7-B6B5D28F95A5}"/>
+                <a16:creationId xmlns:a16="http://schemas.microsoft.com/office/drawing/2014/main" xmlns="" id="{A8704E41-3486-46BD-8AA7-B6B5D28F95A5}"/>
               </a:ext>
             </a:extLst>
           </p:cNvPr>
@@ -14876,7 +14875,7 @@
           <p:cNvPr id="4" name="Slide Number Placeholder 3">
             <a:extLst>
               <a:ext uri="{FF2B5EF4-FFF2-40B4-BE49-F238E27FC236}">
-                <a16:creationId xmlns="" xmlns:a16="http://schemas.microsoft.com/office/drawing/2014/main" id="{02CD92EA-E9CB-4F4C-B1B9-840F11B55DC5}"/>
+                <a16:creationId xmlns:a16="http://schemas.microsoft.com/office/drawing/2014/main" xmlns="" id="{02CD92EA-E9CB-4F4C-B1B9-840F11B55DC5}"/>
               </a:ext>
             </a:extLst>
           </p:cNvPr>
@@ -14922,7 +14921,7 @@
           <p:cNvPr id="5" name="Text Placeholder 4">
             <a:extLst>
               <a:ext uri="{FF2B5EF4-FFF2-40B4-BE49-F238E27FC236}">
-                <a16:creationId xmlns="" xmlns:a16="http://schemas.microsoft.com/office/drawing/2014/main" id="{C22D9F79-04C1-4762-96D6-F3FE8172F1B1}"/>
+                <a16:creationId xmlns:a16="http://schemas.microsoft.com/office/drawing/2014/main" xmlns="" id="{C22D9F79-04C1-4762-96D6-F3FE8172F1B1}"/>
               </a:ext>
             </a:extLst>
           </p:cNvPr>
@@ -14947,7 +14946,7 @@
           <p:cNvPr id="29" name="Oval 28">
             <a:extLst>
               <a:ext uri="{FF2B5EF4-FFF2-40B4-BE49-F238E27FC236}">
-                <a16:creationId xmlns="" xmlns:a16="http://schemas.microsoft.com/office/drawing/2014/main" id="{70018B8E-C8EA-4592-B666-4DD6915C2DAF}"/>
+                <a16:creationId xmlns:a16="http://schemas.microsoft.com/office/drawing/2014/main" xmlns="" id="{70018B8E-C8EA-4592-B666-4DD6915C2DAF}"/>
               </a:ext>
             </a:extLst>
           </p:cNvPr>
@@ -15003,7 +15002,7 @@
           <p:cNvPr id="32" name="Straight Arrow Connector 31">
             <a:extLst>
               <a:ext uri="{FF2B5EF4-FFF2-40B4-BE49-F238E27FC236}">
-                <a16:creationId xmlns="" xmlns:a16="http://schemas.microsoft.com/office/drawing/2014/main" id="{D5D1DDE3-D551-4E6B-AD34-6FBA1762CCD0}"/>
+                <a16:creationId xmlns:a16="http://schemas.microsoft.com/office/drawing/2014/main" xmlns="" id="{D5D1DDE3-D551-4E6B-AD34-6FBA1762CCD0}"/>
               </a:ext>
             </a:extLst>
           </p:cNvPr>
@@ -15047,7 +15046,7 @@
           <p:cNvPr id="34" name="TextBox 33">
             <a:extLst>
               <a:ext uri="{FF2B5EF4-FFF2-40B4-BE49-F238E27FC236}">
-                <a16:creationId xmlns="" xmlns:a16="http://schemas.microsoft.com/office/drawing/2014/main" id="{EA7F15EB-6AA1-4C76-921F-2B04B74B1885}"/>
+                <a16:creationId xmlns:a16="http://schemas.microsoft.com/office/drawing/2014/main" xmlns="" id="{EA7F15EB-6AA1-4C76-921F-2B04B74B1885}"/>
               </a:ext>
             </a:extLst>
           </p:cNvPr>
@@ -15089,7 +15088,7 @@
           <p:cNvPr id="53" name="Oval 52">
             <a:extLst>
               <a:ext uri="{FF2B5EF4-FFF2-40B4-BE49-F238E27FC236}">
-                <a16:creationId xmlns="" xmlns:a16="http://schemas.microsoft.com/office/drawing/2014/main" id="{70018B8E-C8EA-4592-B666-4DD6915C2DAF}"/>
+                <a16:creationId xmlns:a16="http://schemas.microsoft.com/office/drawing/2014/main" xmlns="" id="{70018B8E-C8EA-4592-B666-4DD6915C2DAF}"/>
               </a:ext>
             </a:extLst>
           </p:cNvPr>
@@ -15145,7 +15144,7 @@
           <p:cNvPr id="57" name="Straight Arrow Connector 56">
             <a:extLst>
               <a:ext uri="{FF2B5EF4-FFF2-40B4-BE49-F238E27FC236}">
-                <a16:creationId xmlns="" xmlns:a16="http://schemas.microsoft.com/office/drawing/2014/main" id="{D5D1DDE3-D551-4E6B-AD34-6FBA1762CCD0}"/>
+                <a16:creationId xmlns:a16="http://schemas.microsoft.com/office/drawing/2014/main" xmlns="" id="{D5D1DDE3-D551-4E6B-AD34-6FBA1762CCD0}"/>
               </a:ext>
             </a:extLst>
           </p:cNvPr>
@@ -15189,7 +15188,7 @@
           <p:cNvPr id="59" name="TextBox 58">
             <a:extLst>
               <a:ext uri="{FF2B5EF4-FFF2-40B4-BE49-F238E27FC236}">
-                <a16:creationId xmlns="" xmlns:a16="http://schemas.microsoft.com/office/drawing/2014/main" id="{EA7F15EB-6AA1-4C76-921F-2B04B74B1885}"/>
+                <a16:creationId xmlns:a16="http://schemas.microsoft.com/office/drawing/2014/main" xmlns="" id="{EA7F15EB-6AA1-4C76-921F-2B04B74B1885}"/>
               </a:ext>
             </a:extLst>
           </p:cNvPr>
@@ -15231,7 +15230,7 @@
           <p:cNvPr id="60" name="Oval 59">
             <a:extLst>
               <a:ext uri="{FF2B5EF4-FFF2-40B4-BE49-F238E27FC236}">
-                <a16:creationId xmlns="" xmlns:a16="http://schemas.microsoft.com/office/drawing/2014/main" id="{70018B8E-C8EA-4592-B666-4DD6915C2DAF}"/>
+                <a16:creationId xmlns:a16="http://schemas.microsoft.com/office/drawing/2014/main" xmlns="" id="{70018B8E-C8EA-4592-B666-4DD6915C2DAF}"/>
               </a:ext>
             </a:extLst>
           </p:cNvPr>
@@ -15287,7 +15286,7 @@
           <p:cNvPr id="61" name="Straight Arrow Connector 60">
             <a:extLst>
               <a:ext uri="{FF2B5EF4-FFF2-40B4-BE49-F238E27FC236}">
-                <a16:creationId xmlns="" xmlns:a16="http://schemas.microsoft.com/office/drawing/2014/main" id="{D5D1DDE3-D551-4E6B-AD34-6FBA1762CCD0}"/>
+                <a16:creationId xmlns:a16="http://schemas.microsoft.com/office/drawing/2014/main" xmlns="" id="{D5D1DDE3-D551-4E6B-AD34-6FBA1762CCD0}"/>
               </a:ext>
             </a:extLst>
           </p:cNvPr>
@@ -15331,7 +15330,7 @@
           <p:cNvPr id="62" name="TextBox 61">
             <a:extLst>
               <a:ext uri="{FF2B5EF4-FFF2-40B4-BE49-F238E27FC236}">
-                <a16:creationId xmlns="" xmlns:a16="http://schemas.microsoft.com/office/drawing/2014/main" id="{EA7F15EB-6AA1-4C76-921F-2B04B74B1885}"/>
+                <a16:creationId xmlns:a16="http://schemas.microsoft.com/office/drawing/2014/main" xmlns="" id="{EA7F15EB-6AA1-4C76-921F-2B04B74B1885}"/>
               </a:ext>
             </a:extLst>
           </p:cNvPr>
@@ -15373,7 +15372,7 @@
           <p:cNvPr id="63" name="Oval 62">
             <a:extLst>
               <a:ext uri="{FF2B5EF4-FFF2-40B4-BE49-F238E27FC236}">
-                <a16:creationId xmlns="" xmlns:a16="http://schemas.microsoft.com/office/drawing/2014/main" id="{70018B8E-C8EA-4592-B666-4DD6915C2DAF}"/>
+                <a16:creationId xmlns:a16="http://schemas.microsoft.com/office/drawing/2014/main" xmlns="" id="{70018B8E-C8EA-4592-B666-4DD6915C2DAF}"/>
               </a:ext>
             </a:extLst>
           </p:cNvPr>
@@ -15429,7 +15428,7 @@
           <p:cNvPr id="66" name="TextBox 65">
             <a:extLst>
               <a:ext uri="{FF2B5EF4-FFF2-40B4-BE49-F238E27FC236}">
-                <a16:creationId xmlns="" xmlns:a16="http://schemas.microsoft.com/office/drawing/2014/main" id="{EA7F15EB-6AA1-4C76-921F-2B04B74B1885}"/>
+                <a16:creationId xmlns:a16="http://schemas.microsoft.com/office/drawing/2014/main" xmlns="" id="{EA7F15EB-6AA1-4C76-921F-2B04B74B1885}"/>
               </a:ext>
             </a:extLst>
           </p:cNvPr>
@@ -15471,7 +15470,7 @@
           <p:cNvPr id="76" name="Oval 75">
             <a:extLst>
               <a:ext uri="{FF2B5EF4-FFF2-40B4-BE49-F238E27FC236}">
-                <a16:creationId xmlns="" xmlns:a16="http://schemas.microsoft.com/office/drawing/2014/main" id="{70018B8E-C8EA-4592-B666-4DD6915C2DAF}"/>
+                <a16:creationId xmlns:a16="http://schemas.microsoft.com/office/drawing/2014/main" xmlns="" id="{70018B8E-C8EA-4592-B666-4DD6915C2DAF}"/>
               </a:ext>
             </a:extLst>
           </p:cNvPr>
@@ -15527,7 +15526,7 @@
           <p:cNvPr id="77" name="TextBox 76">
             <a:extLst>
               <a:ext uri="{FF2B5EF4-FFF2-40B4-BE49-F238E27FC236}">
-                <a16:creationId xmlns="" xmlns:a16="http://schemas.microsoft.com/office/drawing/2014/main" id="{EA7F15EB-6AA1-4C76-921F-2B04B74B1885}"/>
+                <a16:creationId xmlns:a16="http://schemas.microsoft.com/office/drawing/2014/main" xmlns="" id="{EA7F15EB-6AA1-4C76-921F-2B04B74B1885}"/>
               </a:ext>
             </a:extLst>
           </p:cNvPr>
@@ -15569,7 +15568,7 @@
           <p:cNvPr id="87" name="Oval 86">
             <a:extLst>
               <a:ext uri="{FF2B5EF4-FFF2-40B4-BE49-F238E27FC236}">
-                <a16:creationId xmlns="" xmlns:a16="http://schemas.microsoft.com/office/drawing/2014/main" id="{70018B8E-C8EA-4592-B666-4DD6915C2DAF}"/>
+                <a16:creationId xmlns:a16="http://schemas.microsoft.com/office/drawing/2014/main" xmlns="" id="{70018B8E-C8EA-4592-B666-4DD6915C2DAF}"/>
               </a:ext>
             </a:extLst>
           </p:cNvPr>
@@ -15625,7 +15624,7 @@
           <p:cNvPr id="88" name="Straight Arrow Connector 87">
             <a:extLst>
               <a:ext uri="{FF2B5EF4-FFF2-40B4-BE49-F238E27FC236}">
-                <a16:creationId xmlns="" xmlns:a16="http://schemas.microsoft.com/office/drawing/2014/main" id="{D5D1DDE3-D551-4E6B-AD34-6FBA1762CCD0}"/>
+                <a16:creationId xmlns:a16="http://schemas.microsoft.com/office/drawing/2014/main" xmlns="" id="{D5D1DDE3-D551-4E6B-AD34-6FBA1762CCD0}"/>
               </a:ext>
             </a:extLst>
           </p:cNvPr>
@@ -15669,7 +15668,7 @@
           <p:cNvPr id="89" name="TextBox 88">
             <a:extLst>
               <a:ext uri="{FF2B5EF4-FFF2-40B4-BE49-F238E27FC236}">
-                <a16:creationId xmlns="" xmlns:a16="http://schemas.microsoft.com/office/drawing/2014/main" id="{EA7F15EB-6AA1-4C76-921F-2B04B74B1885}"/>
+                <a16:creationId xmlns:a16="http://schemas.microsoft.com/office/drawing/2014/main" xmlns="" id="{EA7F15EB-6AA1-4C76-921F-2B04B74B1885}"/>
               </a:ext>
             </a:extLst>
           </p:cNvPr>
@@ -15711,7 +15710,7 @@
           <p:cNvPr id="91" name="Oval 90">
             <a:extLst>
               <a:ext uri="{FF2B5EF4-FFF2-40B4-BE49-F238E27FC236}">
-                <a16:creationId xmlns="" xmlns:a16="http://schemas.microsoft.com/office/drawing/2014/main" id="{70018B8E-C8EA-4592-B666-4DD6915C2DAF}"/>
+                <a16:creationId xmlns:a16="http://schemas.microsoft.com/office/drawing/2014/main" xmlns="" id="{70018B8E-C8EA-4592-B666-4DD6915C2DAF}"/>
               </a:ext>
             </a:extLst>
           </p:cNvPr>
@@ -15767,7 +15766,7 @@
           <p:cNvPr id="92" name="Straight Arrow Connector 91">
             <a:extLst>
               <a:ext uri="{FF2B5EF4-FFF2-40B4-BE49-F238E27FC236}">
-                <a16:creationId xmlns="" xmlns:a16="http://schemas.microsoft.com/office/drawing/2014/main" id="{D5D1DDE3-D551-4E6B-AD34-6FBA1762CCD0}"/>
+                <a16:creationId xmlns:a16="http://schemas.microsoft.com/office/drawing/2014/main" xmlns="" id="{D5D1DDE3-D551-4E6B-AD34-6FBA1762CCD0}"/>
               </a:ext>
             </a:extLst>
           </p:cNvPr>
@@ -15811,7 +15810,7 @@
           <p:cNvPr id="93" name="TextBox 92">
             <a:extLst>
               <a:ext uri="{FF2B5EF4-FFF2-40B4-BE49-F238E27FC236}">
-                <a16:creationId xmlns="" xmlns:a16="http://schemas.microsoft.com/office/drawing/2014/main" id="{EA7F15EB-6AA1-4C76-921F-2B04B74B1885}"/>
+                <a16:creationId xmlns:a16="http://schemas.microsoft.com/office/drawing/2014/main" xmlns="" id="{EA7F15EB-6AA1-4C76-921F-2B04B74B1885}"/>
               </a:ext>
             </a:extLst>
           </p:cNvPr>
@@ -15853,7 +15852,7 @@
           <p:cNvPr id="94" name="Oval 93">
             <a:extLst>
               <a:ext uri="{FF2B5EF4-FFF2-40B4-BE49-F238E27FC236}">
-                <a16:creationId xmlns="" xmlns:a16="http://schemas.microsoft.com/office/drawing/2014/main" id="{70018B8E-C8EA-4592-B666-4DD6915C2DAF}"/>
+                <a16:creationId xmlns:a16="http://schemas.microsoft.com/office/drawing/2014/main" xmlns="" id="{70018B8E-C8EA-4592-B666-4DD6915C2DAF}"/>
               </a:ext>
             </a:extLst>
           </p:cNvPr>
@@ -15909,7 +15908,7 @@
           <p:cNvPr id="95" name="TextBox 94">
             <a:extLst>
               <a:ext uri="{FF2B5EF4-FFF2-40B4-BE49-F238E27FC236}">
-                <a16:creationId xmlns="" xmlns:a16="http://schemas.microsoft.com/office/drawing/2014/main" id="{EA7F15EB-6AA1-4C76-921F-2B04B74B1885}"/>
+                <a16:creationId xmlns:a16="http://schemas.microsoft.com/office/drawing/2014/main" xmlns="" id="{EA7F15EB-6AA1-4C76-921F-2B04B74B1885}"/>
               </a:ext>
             </a:extLst>
           </p:cNvPr>
@@ -15951,7 +15950,7 @@
           <p:cNvPr id="96" name="TextBox 95">
             <a:extLst>
               <a:ext uri="{FF2B5EF4-FFF2-40B4-BE49-F238E27FC236}">
-                <a16:creationId xmlns="" xmlns:a16="http://schemas.microsoft.com/office/drawing/2014/main" id="{A3A739BC-7FC3-41A9-BB1E-19B55BC9B39C}"/>
+                <a16:creationId xmlns:a16="http://schemas.microsoft.com/office/drawing/2014/main" xmlns="" id="{A3A739BC-7FC3-41A9-BB1E-19B55BC9B39C}"/>
               </a:ext>
             </a:extLst>
           </p:cNvPr>
@@ -16004,7 +16003,7 @@
           <p:cNvPr id="97" name="TextBox 96">
             <a:extLst>
               <a:ext uri="{FF2B5EF4-FFF2-40B4-BE49-F238E27FC236}">
-                <a16:creationId xmlns="" xmlns:a16="http://schemas.microsoft.com/office/drawing/2014/main" id="{A3A739BC-7FC3-41A9-BB1E-19B55BC9B39C}"/>
+                <a16:creationId xmlns:a16="http://schemas.microsoft.com/office/drawing/2014/main" xmlns="" id="{A3A739BC-7FC3-41A9-BB1E-19B55BC9B39C}"/>
               </a:ext>
             </a:extLst>
           </p:cNvPr>
@@ -16057,7 +16056,7 @@
           <p:cNvPr id="98" name="Straight Arrow Connector 97">
             <a:extLst>
               <a:ext uri="{FF2B5EF4-FFF2-40B4-BE49-F238E27FC236}">
-                <a16:creationId xmlns="" xmlns:a16="http://schemas.microsoft.com/office/drawing/2014/main" id="{D5D1DDE3-D551-4E6B-AD34-6FBA1762CCD0}"/>
+                <a16:creationId xmlns:a16="http://schemas.microsoft.com/office/drawing/2014/main" xmlns="" id="{D5D1DDE3-D551-4E6B-AD34-6FBA1762CCD0}"/>
               </a:ext>
             </a:extLst>
           </p:cNvPr>
@@ -16101,7 +16100,7 @@
           <p:cNvPr id="99" name="Straight Arrow Connector 98">
             <a:extLst>
               <a:ext uri="{FF2B5EF4-FFF2-40B4-BE49-F238E27FC236}">
-                <a16:creationId xmlns="" xmlns:a16="http://schemas.microsoft.com/office/drawing/2014/main" id="{D5D1DDE3-D551-4E6B-AD34-6FBA1762CCD0}"/>
+                <a16:creationId xmlns:a16="http://schemas.microsoft.com/office/drawing/2014/main" xmlns="" id="{D5D1DDE3-D551-4E6B-AD34-6FBA1762CCD0}"/>
               </a:ext>
             </a:extLst>
           </p:cNvPr>
@@ -16145,7 +16144,7 @@
           <p:cNvPr id="100" name="Straight Arrow Connector 99">
             <a:extLst>
               <a:ext uri="{FF2B5EF4-FFF2-40B4-BE49-F238E27FC236}">
-                <a16:creationId xmlns="" xmlns:a16="http://schemas.microsoft.com/office/drawing/2014/main" id="{D5D1DDE3-D551-4E6B-AD34-6FBA1762CCD0}"/>
+                <a16:creationId xmlns:a16="http://schemas.microsoft.com/office/drawing/2014/main" xmlns="" id="{D5D1DDE3-D551-4E6B-AD34-6FBA1762CCD0}"/>
               </a:ext>
             </a:extLst>
           </p:cNvPr>
@@ -16189,7 +16188,7 @@
           <p:cNvPr id="102" name="TextBox 101">
             <a:extLst>
               <a:ext uri="{FF2B5EF4-FFF2-40B4-BE49-F238E27FC236}">
-                <a16:creationId xmlns="" xmlns:a16="http://schemas.microsoft.com/office/drawing/2014/main" id="{DCF44781-E941-421E-89BE-0ABCA37EDACB}"/>
+                <a16:creationId xmlns:a16="http://schemas.microsoft.com/office/drawing/2014/main" xmlns="" id="{DCF44781-E941-421E-89BE-0ABCA37EDACB}"/>
               </a:ext>
             </a:extLst>
           </p:cNvPr>
@@ -16242,7 +16241,7 @@
           <p:cNvPr id="105" name="TextBox 104">
             <a:extLst>
               <a:ext uri="{FF2B5EF4-FFF2-40B4-BE49-F238E27FC236}">
-                <a16:creationId xmlns="" xmlns:a16="http://schemas.microsoft.com/office/drawing/2014/main" id="{E2424417-DD1B-4E8D-A2A5-F034A489C27A}"/>
+                <a16:creationId xmlns:a16="http://schemas.microsoft.com/office/drawing/2014/main" xmlns="" id="{E2424417-DD1B-4E8D-A2A5-F034A489C27A}"/>
               </a:ext>
             </a:extLst>
           </p:cNvPr>
@@ -16295,7 +16294,7 @@
           <p:cNvPr id="106" name="TextBox 105">
             <a:extLst>
               <a:ext uri="{FF2B5EF4-FFF2-40B4-BE49-F238E27FC236}">
-                <a16:creationId xmlns="" xmlns:a16="http://schemas.microsoft.com/office/drawing/2014/main" id="{226BC8B6-2411-443E-BEE4-F24BDE166FA2}"/>
+                <a16:creationId xmlns:a16="http://schemas.microsoft.com/office/drawing/2014/main" xmlns="" id="{226BC8B6-2411-443E-BEE4-F24BDE166FA2}"/>
               </a:ext>
             </a:extLst>
           </p:cNvPr>
@@ -16348,7 +16347,7 @@
           <p:cNvPr id="107" name="TextBox 106">
             <a:extLst>
               <a:ext uri="{FF2B5EF4-FFF2-40B4-BE49-F238E27FC236}">
-                <a16:creationId xmlns="" xmlns:a16="http://schemas.microsoft.com/office/drawing/2014/main" id="{53330DED-8238-48AB-B79C-3155945E34EF}"/>
+                <a16:creationId xmlns:a16="http://schemas.microsoft.com/office/drawing/2014/main" xmlns="" id="{53330DED-8238-48AB-B79C-3155945E34EF}"/>
               </a:ext>
             </a:extLst>
           </p:cNvPr>
@@ -16415,7 +16414,7 @@
           <p:cNvPr id="108" name="TextBox 107">
             <a:extLst>
               <a:ext uri="{FF2B5EF4-FFF2-40B4-BE49-F238E27FC236}">
-                <a16:creationId xmlns="" xmlns:a16="http://schemas.microsoft.com/office/drawing/2014/main" id="{53330DED-8238-48AB-B79C-3155945E34EF}"/>
+                <a16:creationId xmlns:a16="http://schemas.microsoft.com/office/drawing/2014/main" xmlns="" id="{53330DED-8238-48AB-B79C-3155945E34EF}"/>
               </a:ext>
             </a:extLst>
           </p:cNvPr>
@@ -16482,7 +16481,7 @@
           <p:cNvPr id="110" name="Straight Arrow Connector 109">
             <a:extLst>
               <a:ext uri="{FF2B5EF4-FFF2-40B4-BE49-F238E27FC236}">
-                <a16:creationId xmlns="" xmlns:a16="http://schemas.microsoft.com/office/drawing/2014/main" id="{D5D1DDE3-D551-4E6B-AD34-6FBA1762CCD0}"/>
+                <a16:creationId xmlns:a16="http://schemas.microsoft.com/office/drawing/2014/main" xmlns="" id="{D5D1DDE3-D551-4E6B-AD34-6FBA1762CCD0}"/>
               </a:ext>
             </a:extLst>
           </p:cNvPr>
@@ -16594,7 +16593,7 @@
           <p:cNvPr id="45" name="Oval 44">
             <a:extLst>
               <a:ext uri="{FF2B5EF4-FFF2-40B4-BE49-F238E27FC236}">
-                <a16:creationId xmlns="" xmlns:a16="http://schemas.microsoft.com/office/drawing/2014/main" id="{70018B8E-C8EA-4592-B666-4DD6915C2DAF}"/>
+                <a16:creationId xmlns:a16="http://schemas.microsoft.com/office/drawing/2014/main" xmlns="" id="{70018B8E-C8EA-4592-B666-4DD6915C2DAF}"/>
               </a:ext>
             </a:extLst>
           </p:cNvPr>
@@ -16652,7 +16651,7 @@
           <p:cNvPr id="46" name="Oval 45">
             <a:extLst>
               <a:ext uri="{FF2B5EF4-FFF2-40B4-BE49-F238E27FC236}">
-                <a16:creationId xmlns="" xmlns:a16="http://schemas.microsoft.com/office/drawing/2014/main" id="{70018B8E-C8EA-4592-B666-4DD6915C2DAF}"/>
+                <a16:creationId xmlns:a16="http://schemas.microsoft.com/office/drawing/2014/main" xmlns="" id="{70018B8E-C8EA-4592-B666-4DD6915C2DAF}"/>
               </a:ext>
             </a:extLst>
           </p:cNvPr>
@@ -16710,7 +16709,7 @@
           <p:cNvPr id="47" name="TextBox 46">
             <a:extLst>
               <a:ext uri="{FF2B5EF4-FFF2-40B4-BE49-F238E27FC236}">
-                <a16:creationId xmlns="" xmlns:a16="http://schemas.microsoft.com/office/drawing/2014/main" id="{226BC8B6-2411-443E-BEE4-F24BDE166FA2}"/>
+                <a16:creationId xmlns:a16="http://schemas.microsoft.com/office/drawing/2014/main" xmlns="" id="{226BC8B6-2411-443E-BEE4-F24BDE166FA2}"/>
               </a:ext>
             </a:extLst>
           </p:cNvPr>
@@ -16763,7 +16762,7 @@
           <p:cNvPr id="48" name="Oval 47">
             <a:extLst>
               <a:ext uri="{FF2B5EF4-FFF2-40B4-BE49-F238E27FC236}">
-                <a16:creationId xmlns="" xmlns:a16="http://schemas.microsoft.com/office/drawing/2014/main" id="{70018B8E-C8EA-4592-B666-4DD6915C2DAF}"/>
+                <a16:creationId xmlns:a16="http://schemas.microsoft.com/office/drawing/2014/main" xmlns="" id="{70018B8E-C8EA-4592-B666-4DD6915C2DAF}"/>
               </a:ext>
             </a:extLst>
           </p:cNvPr>
@@ -16821,7 +16820,7 @@
           <p:cNvPr id="49" name="Oval 48">
             <a:extLst>
               <a:ext uri="{FF2B5EF4-FFF2-40B4-BE49-F238E27FC236}">
-                <a16:creationId xmlns="" xmlns:a16="http://schemas.microsoft.com/office/drawing/2014/main" id="{70018B8E-C8EA-4592-B666-4DD6915C2DAF}"/>
+                <a16:creationId xmlns:a16="http://schemas.microsoft.com/office/drawing/2014/main" xmlns="" id="{70018B8E-C8EA-4592-B666-4DD6915C2DAF}"/>
               </a:ext>
             </a:extLst>
           </p:cNvPr>
@@ -17714,7 +17713,7 @@
           <p:cNvPr id="2" name="Title 1">
             <a:extLst>
               <a:ext uri="{FF2B5EF4-FFF2-40B4-BE49-F238E27FC236}">
-                <a16:creationId xmlns="" xmlns:a16="http://schemas.microsoft.com/office/drawing/2014/main" id="{C14F0455-9ED9-4652-8FD6-9C284BE2F092}"/>
+                <a16:creationId xmlns:a16="http://schemas.microsoft.com/office/drawing/2014/main" xmlns="" id="{C14F0455-9ED9-4652-8FD6-9C284BE2F092}"/>
               </a:ext>
             </a:extLst>
           </p:cNvPr>
@@ -17757,7 +17756,7 @@
           <p:cNvPr id="3" name="Text Placeholder 2">
             <a:extLst>
               <a:ext uri="{FF2B5EF4-FFF2-40B4-BE49-F238E27FC236}">
-                <a16:creationId xmlns="" xmlns:a16="http://schemas.microsoft.com/office/drawing/2014/main" id="{8136025E-6B8D-4575-9E2B-B0AAB8CAC233}"/>
+                <a16:creationId xmlns:a16="http://schemas.microsoft.com/office/drawing/2014/main" xmlns="" id="{8136025E-6B8D-4575-9E2B-B0AAB8CAC233}"/>
               </a:ext>
             </a:extLst>
           </p:cNvPr>
@@ -17822,7 +17821,7 @@
           <p:cNvPr id="109" name="Rectangle: Single Corner Snipped 39">
             <a:extLst>
               <a:ext uri="{FF2B5EF4-FFF2-40B4-BE49-F238E27FC236}">
-                <a16:creationId xmlns="" xmlns:a16="http://schemas.microsoft.com/office/drawing/2014/main" id="{331B82C4-A8A8-4CAA-9AD1-5A2312BDD52B}"/>
+                <a16:creationId xmlns:a16="http://schemas.microsoft.com/office/drawing/2014/main" xmlns="" id="{331B82C4-A8A8-4CAA-9AD1-5A2312BDD52B}"/>
               </a:ext>
             </a:extLst>
           </p:cNvPr>
@@ -17905,7 +17904,7 @@
           <p:cNvPr id="103" name="Rectangle: Single Corner Snipped 53">
             <a:extLst>
               <a:ext uri="{FF2B5EF4-FFF2-40B4-BE49-F238E27FC236}">
-                <a16:creationId xmlns="" xmlns:a16="http://schemas.microsoft.com/office/drawing/2014/main" id="{7A50EE12-18BC-43CD-9927-59B1DBE1FF93}"/>
+                <a16:creationId xmlns:a16="http://schemas.microsoft.com/office/drawing/2014/main" xmlns="" id="{7A50EE12-18BC-43CD-9927-59B1DBE1FF93}"/>
               </a:ext>
             </a:extLst>
           </p:cNvPr>
@@ -18056,7 +18055,7 @@
           <p:cNvPr id="101" name="Rectangle: Single Corner Snipped 54">
             <a:extLst>
               <a:ext uri="{FF2B5EF4-FFF2-40B4-BE49-F238E27FC236}">
-                <a16:creationId xmlns="" xmlns:a16="http://schemas.microsoft.com/office/drawing/2014/main" id="{5DD2CB3A-1BD2-41AE-B00E-AF542B712862}"/>
+                <a16:creationId xmlns:a16="http://schemas.microsoft.com/office/drawing/2014/main" xmlns="" id="{5DD2CB3A-1BD2-41AE-B00E-AF542B712862}"/>
               </a:ext>
             </a:extLst>
           </p:cNvPr>
@@ -18137,7 +18136,7 @@
           <p:cNvPr id="3" name="Title 2">
             <a:extLst>
               <a:ext uri="{FF2B5EF4-FFF2-40B4-BE49-F238E27FC236}">
-                <a16:creationId xmlns="" xmlns:a16="http://schemas.microsoft.com/office/drawing/2014/main" id="{A8704E41-3486-46BD-8AA7-B6B5D28F95A5}"/>
+                <a16:creationId xmlns:a16="http://schemas.microsoft.com/office/drawing/2014/main" xmlns="" id="{A8704E41-3486-46BD-8AA7-B6B5D28F95A5}"/>
               </a:ext>
             </a:extLst>
           </p:cNvPr>
@@ -18166,7 +18165,7 @@
           <p:cNvPr id="4" name="Slide Number Placeholder 3">
             <a:extLst>
               <a:ext uri="{FF2B5EF4-FFF2-40B4-BE49-F238E27FC236}">
-                <a16:creationId xmlns="" xmlns:a16="http://schemas.microsoft.com/office/drawing/2014/main" id="{02CD92EA-E9CB-4F4C-B1B9-840F11B55DC5}"/>
+                <a16:creationId xmlns:a16="http://schemas.microsoft.com/office/drawing/2014/main" xmlns="" id="{02CD92EA-E9CB-4F4C-B1B9-840F11B55DC5}"/>
               </a:ext>
             </a:extLst>
           </p:cNvPr>
@@ -18212,7 +18211,7 @@
           <p:cNvPr id="5" name="Text Placeholder 4">
             <a:extLst>
               <a:ext uri="{FF2B5EF4-FFF2-40B4-BE49-F238E27FC236}">
-                <a16:creationId xmlns="" xmlns:a16="http://schemas.microsoft.com/office/drawing/2014/main" id="{C22D9F79-04C1-4762-96D6-F3FE8172F1B1}"/>
+                <a16:creationId xmlns:a16="http://schemas.microsoft.com/office/drawing/2014/main" xmlns="" id="{C22D9F79-04C1-4762-96D6-F3FE8172F1B1}"/>
               </a:ext>
             </a:extLst>
           </p:cNvPr>
@@ -18237,7 +18236,7 @@
           <p:cNvPr id="29" name="Oval 28">
             <a:extLst>
               <a:ext uri="{FF2B5EF4-FFF2-40B4-BE49-F238E27FC236}">
-                <a16:creationId xmlns="" xmlns:a16="http://schemas.microsoft.com/office/drawing/2014/main" id="{70018B8E-C8EA-4592-B666-4DD6915C2DAF}"/>
+                <a16:creationId xmlns:a16="http://schemas.microsoft.com/office/drawing/2014/main" xmlns="" id="{70018B8E-C8EA-4592-B666-4DD6915C2DAF}"/>
               </a:ext>
             </a:extLst>
           </p:cNvPr>
@@ -18293,7 +18292,7 @@
           <p:cNvPr id="32" name="Straight Arrow Connector 31">
             <a:extLst>
               <a:ext uri="{FF2B5EF4-FFF2-40B4-BE49-F238E27FC236}">
-                <a16:creationId xmlns="" xmlns:a16="http://schemas.microsoft.com/office/drawing/2014/main" id="{D5D1DDE3-D551-4E6B-AD34-6FBA1762CCD0}"/>
+                <a16:creationId xmlns:a16="http://schemas.microsoft.com/office/drawing/2014/main" xmlns="" id="{D5D1DDE3-D551-4E6B-AD34-6FBA1762CCD0}"/>
               </a:ext>
             </a:extLst>
           </p:cNvPr>
@@ -18337,7 +18336,7 @@
           <p:cNvPr id="34" name="TextBox 33">
             <a:extLst>
               <a:ext uri="{FF2B5EF4-FFF2-40B4-BE49-F238E27FC236}">
-                <a16:creationId xmlns="" xmlns:a16="http://schemas.microsoft.com/office/drawing/2014/main" id="{EA7F15EB-6AA1-4C76-921F-2B04B74B1885}"/>
+                <a16:creationId xmlns:a16="http://schemas.microsoft.com/office/drawing/2014/main" xmlns="" id="{EA7F15EB-6AA1-4C76-921F-2B04B74B1885}"/>
               </a:ext>
             </a:extLst>
           </p:cNvPr>
@@ -18379,7 +18378,7 @@
           <p:cNvPr id="53" name="Oval 52">
             <a:extLst>
               <a:ext uri="{FF2B5EF4-FFF2-40B4-BE49-F238E27FC236}">
-                <a16:creationId xmlns="" xmlns:a16="http://schemas.microsoft.com/office/drawing/2014/main" id="{70018B8E-C8EA-4592-B666-4DD6915C2DAF}"/>
+                <a16:creationId xmlns:a16="http://schemas.microsoft.com/office/drawing/2014/main" xmlns="" id="{70018B8E-C8EA-4592-B666-4DD6915C2DAF}"/>
               </a:ext>
             </a:extLst>
           </p:cNvPr>
@@ -18435,7 +18434,7 @@
           <p:cNvPr id="57" name="Straight Arrow Connector 56">
             <a:extLst>
               <a:ext uri="{FF2B5EF4-FFF2-40B4-BE49-F238E27FC236}">
-                <a16:creationId xmlns="" xmlns:a16="http://schemas.microsoft.com/office/drawing/2014/main" id="{D5D1DDE3-D551-4E6B-AD34-6FBA1762CCD0}"/>
+                <a16:creationId xmlns:a16="http://schemas.microsoft.com/office/drawing/2014/main" xmlns="" id="{D5D1DDE3-D551-4E6B-AD34-6FBA1762CCD0}"/>
               </a:ext>
             </a:extLst>
           </p:cNvPr>
@@ -18479,7 +18478,7 @@
           <p:cNvPr id="59" name="TextBox 58">
             <a:extLst>
               <a:ext uri="{FF2B5EF4-FFF2-40B4-BE49-F238E27FC236}">
-                <a16:creationId xmlns="" xmlns:a16="http://schemas.microsoft.com/office/drawing/2014/main" id="{EA7F15EB-6AA1-4C76-921F-2B04B74B1885}"/>
+                <a16:creationId xmlns:a16="http://schemas.microsoft.com/office/drawing/2014/main" xmlns="" id="{EA7F15EB-6AA1-4C76-921F-2B04B74B1885}"/>
               </a:ext>
             </a:extLst>
           </p:cNvPr>
@@ -18521,7 +18520,7 @@
           <p:cNvPr id="60" name="Oval 59">
             <a:extLst>
               <a:ext uri="{FF2B5EF4-FFF2-40B4-BE49-F238E27FC236}">
-                <a16:creationId xmlns="" xmlns:a16="http://schemas.microsoft.com/office/drawing/2014/main" id="{70018B8E-C8EA-4592-B666-4DD6915C2DAF}"/>
+                <a16:creationId xmlns:a16="http://schemas.microsoft.com/office/drawing/2014/main" xmlns="" id="{70018B8E-C8EA-4592-B666-4DD6915C2DAF}"/>
               </a:ext>
             </a:extLst>
           </p:cNvPr>
@@ -18577,7 +18576,7 @@
           <p:cNvPr id="61" name="Straight Arrow Connector 60">
             <a:extLst>
               <a:ext uri="{FF2B5EF4-FFF2-40B4-BE49-F238E27FC236}">
-                <a16:creationId xmlns="" xmlns:a16="http://schemas.microsoft.com/office/drawing/2014/main" id="{D5D1DDE3-D551-4E6B-AD34-6FBA1762CCD0}"/>
+                <a16:creationId xmlns:a16="http://schemas.microsoft.com/office/drawing/2014/main" xmlns="" id="{D5D1DDE3-D551-4E6B-AD34-6FBA1762CCD0}"/>
               </a:ext>
             </a:extLst>
           </p:cNvPr>
@@ -18621,7 +18620,7 @@
           <p:cNvPr id="62" name="TextBox 61">
             <a:extLst>
               <a:ext uri="{FF2B5EF4-FFF2-40B4-BE49-F238E27FC236}">
-                <a16:creationId xmlns="" xmlns:a16="http://schemas.microsoft.com/office/drawing/2014/main" id="{EA7F15EB-6AA1-4C76-921F-2B04B74B1885}"/>
+                <a16:creationId xmlns:a16="http://schemas.microsoft.com/office/drawing/2014/main" xmlns="" id="{EA7F15EB-6AA1-4C76-921F-2B04B74B1885}"/>
               </a:ext>
             </a:extLst>
           </p:cNvPr>
@@ -18663,7 +18662,7 @@
           <p:cNvPr id="63" name="Oval 62">
             <a:extLst>
               <a:ext uri="{FF2B5EF4-FFF2-40B4-BE49-F238E27FC236}">
-                <a16:creationId xmlns="" xmlns:a16="http://schemas.microsoft.com/office/drawing/2014/main" id="{70018B8E-C8EA-4592-B666-4DD6915C2DAF}"/>
+                <a16:creationId xmlns:a16="http://schemas.microsoft.com/office/drawing/2014/main" xmlns="" id="{70018B8E-C8EA-4592-B666-4DD6915C2DAF}"/>
               </a:ext>
             </a:extLst>
           </p:cNvPr>
@@ -18719,7 +18718,7 @@
           <p:cNvPr id="66" name="TextBox 65">
             <a:extLst>
               <a:ext uri="{FF2B5EF4-FFF2-40B4-BE49-F238E27FC236}">
-                <a16:creationId xmlns="" xmlns:a16="http://schemas.microsoft.com/office/drawing/2014/main" id="{EA7F15EB-6AA1-4C76-921F-2B04B74B1885}"/>
+                <a16:creationId xmlns:a16="http://schemas.microsoft.com/office/drawing/2014/main" xmlns="" id="{EA7F15EB-6AA1-4C76-921F-2B04B74B1885}"/>
               </a:ext>
             </a:extLst>
           </p:cNvPr>
@@ -18761,7 +18760,7 @@
           <p:cNvPr id="67" name="Oval 66">
             <a:extLst>
               <a:ext uri="{FF2B5EF4-FFF2-40B4-BE49-F238E27FC236}">
-                <a16:creationId xmlns="" xmlns:a16="http://schemas.microsoft.com/office/drawing/2014/main" id="{70018B8E-C8EA-4592-B666-4DD6915C2DAF}"/>
+                <a16:creationId xmlns:a16="http://schemas.microsoft.com/office/drawing/2014/main" xmlns="" id="{70018B8E-C8EA-4592-B666-4DD6915C2DAF}"/>
               </a:ext>
             </a:extLst>
           </p:cNvPr>
@@ -18817,7 +18816,7 @@
           <p:cNvPr id="70" name="TextBox 69">
             <a:extLst>
               <a:ext uri="{FF2B5EF4-FFF2-40B4-BE49-F238E27FC236}">
-                <a16:creationId xmlns="" xmlns:a16="http://schemas.microsoft.com/office/drawing/2014/main" id="{EA7F15EB-6AA1-4C76-921F-2B04B74B1885}"/>
+                <a16:creationId xmlns:a16="http://schemas.microsoft.com/office/drawing/2014/main" xmlns="" id="{EA7F15EB-6AA1-4C76-921F-2B04B74B1885}"/>
               </a:ext>
             </a:extLst>
           </p:cNvPr>
@@ -18859,7 +18858,7 @@
           <p:cNvPr id="72" name="Straight Arrow Connector 71">
             <a:extLst>
               <a:ext uri="{FF2B5EF4-FFF2-40B4-BE49-F238E27FC236}">
-                <a16:creationId xmlns="" xmlns:a16="http://schemas.microsoft.com/office/drawing/2014/main" id="{D5D1DDE3-D551-4E6B-AD34-6FBA1762CCD0}"/>
+                <a16:creationId xmlns:a16="http://schemas.microsoft.com/office/drawing/2014/main" xmlns="" id="{D5D1DDE3-D551-4E6B-AD34-6FBA1762CCD0}"/>
               </a:ext>
             </a:extLst>
           </p:cNvPr>
@@ -18903,7 +18902,7 @@
           <p:cNvPr id="76" name="Oval 75">
             <a:extLst>
               <a:ext uri="{FF2B5EF4-FFF2-40B4-BE49-F238E27FC236}">
-                <a16:creationId xmlns="" xmlns:a16="http://schemas.microsoft.com/office/drawing/2014/main" id="{70018B8E-C8EA-4592-B666-4DD6915C2DAF}"/>
+                <a16:creationId xmlns:a16="http://schemas.microsoft.com/office/drawing/2014/main" xmlns="" id="{70018B8E-C8EA-4592-B666-4DD6915C2DAF}"/>
               </a:ext>
             </a:extLst>
           </p:cNvPr>
@@ -18959,7 +18958,7 @@
           <p:cNvPr id="77" name="TextBox 76">
             <a:extLst>
               <a:ext uri="{FF2B5EF4-FFF2-40B4-BE49-F238E27FC236}">
-                <a16:creationId xmlns="" xmlns:a16="http://schemas.microsoft.com/office/drawing/2014/main" id="{EA7F15EB-6AA1-4C76-921F-2B04B74B1885}"/>
+                <a16:creationId xmlns:a16="http://schemas.microsoft.com/office/drawing/2014/main" xmlns="" id="{EA7F15EB-6AA1-4C76-921F-2B04B74B1885}"/>
               </a:ext>
             </a:extLst>
           </p:cNvPr>
@@ -19001,7 +19000,7 @@
           <p:cNvPr id="87" name="Oval 86">
             <a:extLst>
               <a:ext uri="{FF2B5EF4-FFF2-40B4-BE49-F238E27FC236}">
-                <a16:creationId xmlns="" xmlns:a16="http://schemas.microsoft.com/office/drawing/2014/main" id="{70018B8E-C8EA-4592-B666-4DD6915C2DAF}"/>
+                <a16:creationId xmlns:a16="http://schemas.microsoft.com/office/drawing/2014/main" xmlns="" id="{70018B8E-C8EA-4592-B666-4DD6915C2DAF}"/>
               </a:ext>
             </a:extLst>
           </p:cNvPr>
@@ -19057,7 +19056,7 @@
           <p:cNvPr id="88" name="Straight Arrow Connector 87">
             <a:extLst>
               <a:ext uri="{FF2B5EF4-FFF2-40B4-BE49-F238E27FC236}">
-                <a16:creationId xmlns="" xmlns:a16="http://schemas.microsoft.com/office/drawing/2014/main" id="{D5D1DDE3-D551-4E6B-AD34-6FBA1762CCD0}"/>
+                <a16:creationId xmlns:a16="http://schemas.microsoft.com/office/drawing/2014/main" xmlns="" id="{D5D1DDE3-D551-4E6B-AD34-6FBA1762CCD0}"/>
               </a:ext>
             </a:extLst>
           </p:cNvPr>
@@ -19101,7 +19100,7 @@
           <p:cNvPr id="89" name="TextBox 88">
             <a:extLst>
               <a:ext uri="{FF2B5EF4-FFF2-40B4-BE49-F238E27FC236}">
-                <a16:creationId xmlns="" xmlns:a16="http://schemas.microsoft.com/office/drawing/2014/main" id="{EA7F15EB-6AA1-4C76-921F-2B04B74B1885}"/>
+                <a16:creationId xmlns:a16="http://schemas.microsoft.com/office/drawing/2014/main" xmlns="" id="{EA7F15EB-6AA1-4C76-921F-2B04B74B1885}"/>
               </a:ext>
             </a:extLst>
           </p:cNvPr>
@@ -19143,7 +19142,7 @@
           <p:cNvPr id="91" name="Oval 90">
             <a:extLst>
               <a:ext uri="{FF2B5EF4-FFF2-40B4-BE49-F238E27FC236}">
-                <a16:creationId xmlns="" xmlns:a16="http://schemas.microsoft.com/office/drawing/2014/main" id="{70018B8E-C8EA-4592-B666-4DD6915C2DAF}"/>
+                <a16:creationId xmlns:a16="http://schemas.microsoft.com/office/drawing/2014/main" xmlns="" id="{70018B8E-C8EA-4592-B666-4DD6915C2DAF}"/>
               </a:ext>
             </a:extLst>
           </p:cNvPr>
@@ -19199,7 +19198,7 @@
           <p:cNvPr id="92" name="Straight Arrow Connector 91">
             <a:extLst>
               <a:ext uri="{FF2B5EF4-FFF2-40B4-BE49-F238E27FC236}">
-                <a16:creationId xmlns="" xmlns:a16="http://schemas.microsoft.com/office/drawing/2014/main" id="{D5D1DDE3-D551-4E6B-AD34-6FBA1762CCD0}"/>
+                <a16:creationId xmlns:a16="http://schemas.microsoft.com/office/drawing/2014/main" xmlns="" id="{D5D1DDE3-D551-4E6B-AD34-6FBA1762CCD0}"/>
               </a:ext>
             </a:extLst>
           </p:cNvPr>
@@ -19243,7 +19242,7 @@
           <p:cNvPr id="93" name="TextBox 92">
             <a:extLst>
               <a:ext uri="{FF2B5EF4-FFF2-40B4-BE49-F238E27FC236}">
-                <a16:creationId xmlns="" xmlns:a16="http://schemas.microsoft.com/office/drawing/2014/main" id="{EA7F15EB-6AA1-4C76-921F-2B04B74B1885}"/>
+                <a16:creationId xmlns:a16="http://schemas.microsoft.com/office/drawing/2014/main" xmlns="" id="{EA7F15EB-6AA1-4C76-921F-2B04B74B1885}"/>
               </a:ext>
             </a:extLst>
           </p:cNvPr>
@@ -19285,7 +19284,7 @@
           <p:cNvPr id="94" name="Oval 93">
             <a:extLst>
               <a:ext uri="{FF2B5EF4-FFF2-40B4-BE49-F238E27FC236}">
-                <a16:creationId xmlns="" xmlns:a16="http://schemas.microsoft.com/office/drawing/2014/main" id="{70018B8E-C8EA-4592-B666-4DD6915C2DAF}"/>
+                <a16:creationId xmlns:a16="http://schemas.microsoft.com/office/drawing/2014/main" xmlns="" id="{70018B8E-C8EA-4592-B666-4DD6915C2DAF}"/>
               </a:ext>
             </a:extLst>
           </p:cNvPr>
@@ -19341,7 +19340,7 @@
           <p:cNvPr id="95" name="TextBox 94">
             <a:extLst>
               <a:ext uri="{FF2B5EF4-FFF2-40B4-BE49-F238E27FC236}">
-                <a16:creationId xmlns="" xmlns:a16="http://schemas.microsoft.com/office/drawing/2014/main" id="{EA7F15EB-6AA1-4C76-921F-2B04B74B1885}"/>
+                <a16:creationId xmlns:a16="http://schemas.microsoft.com/office/drawing/2014/main" xmlns="" id="{EA7F15EB-6AA1-4C76-921F-2B04B74B1885}"/>
               </a:ext>
             </a:extLst>
           </p:cNvPr>
@@ -19383,7 +19382,7 @@
           <p:cNvPr id="96" name="TextBox 95">
             <a:extLst>
               <a:ext uri="{FF2B5EF4-FFF2-40B4-BE49-F238E27FC236}">
-                <a16:creationId xmlns="" xmlns:a16="http://schemas.microsoft.com/office/drawing/2014/main" id="{A3A739BC-7FC3-41A9-BB1E-19B55BC9B39C}"/>
+                <a16:creationId xmlns:a16="http://schemas.microsoft.com/office/drawing/2014/main" xmlns="" id="{A3A739BC-7FC3-41A9-BB1E-19B55BC9B39C}"/>
               </a:ext>
             </a:extLst>
           </p:cNvPr>
@@ -19436,7 +19435,7 @@
           <p:cNvPr id="97" name="TextBox 96">
             <a:extLst>
               <a:ext uri="{FF2B5EF4-FFF2-40B4-BE49-F238E27FC236}">
-                <a16:creationId xmlns="" xmlns:a16="http://schemas.microsoft.com/office/drawing/2014/main" id="{A3A739BC-7FC3-41A9-BB1E-19B55BC9B39C}"/>
+                <a16:creationId xmlns:a16="http://schemas.microsoft.com/office/drawing/2014/main" xmlns="" id="{A3A739BC-7FC3-41A9-BB1E-19B55BC9B39C}"/>
               </a:ext>
             </a:extLst>
           </p:cNvPr>
@@ -19489,7 +19488,7 @@
           <p:cNvPr id="98" name="Straight Arrow Connector 97">
             <a:extLst>
               <a:ext uri="{FF2B5EF4-FFF2-40B4-BE49-F238E27FC236}">
-                <a16:creationId xmlns="" xmlns:a16="http://schemas.microsoft.com/office/drawing/2014/main" id="{D5D1DDE3-D551-4E6B-AD34-6FBA1762CCD0}"/>
+                <a16:creationId xmlns:a16="http://schemas.microsoft.com/office/drawing/2014/main" xmlns="" id="{D5D1DDE3-D551-4E6B-AD34-6FBA1762CCD0}"/>
               </a:ext>
             </a:extLst>
           </p:cNvPr>
@@ -19533,7 +19532,7 @@
           <p:cNvPr id="99" name="Straight Arrow Connector 98">
             <a:extLst>
               <a:ext uri="{FF2B5EF4-FFF2-40B4-BE49-F238E27FC236}">
-                <a16:creationId xmlns="" xmlns:a16="http://schemas.microsoft.com/office/drawing/2014/main" id="{D5D1DDE3-D551-4E6B-AD34-6FBA1762CCD0}"/>
+                <a16:creationId xmlns:a16="http://schemas.microsoft.com/office/drawing/2014/main" xmlns="" id="{D5D1DDE3-D551-4E6B-AD34-6FBA1762CCD0}"/>
               </a:ext>
             </a:extLst>
           </p:cNvPr>
@@ -19577,7 +19576,7 @@
           <p:cNvPr id="100" name="Straight Arrow Connector 99">
             <a:extLst>
               <a:ext uri="{FF2B5EF4-FFF2-40B4-BE49-F238E27FC236}">
-                <a16:creationId xmlns="" xmlns:a16="http://schemas.microsoft.com/office/drawing/2014/main" id="{D5D1DDE3-D551-4E6B-AD34-6FBA1762CCD0}"/>
+                <a16:creationId xmlns:a16="http://schemas.microsoft.com/office/drawing/2014/main" xmlns="" id="{D5D1DDE3-D551-4E6B-AD34-6FBA1762CCD0}"/>
               </a:ext>
             </a:extLst>
           </p:cNvPr>
@@ -19621,7 +19620,7 @@
           <p:cNvPr id="102" name="TextBox 101">
             <a:extLst>
               <a:ext uri="{FF2B5EF4-FFF2-40B4-BE49-F238E27FC236}">
-                <a16:creationId xmlns="" xmlns:a16="http://schemas.microsoft.com/office/drawing/2014/main" id="{DCF44781-E941-421E-89BE-0ABCA37EDACB}"/>
+                <a16:creationId xmlns:a16="http://schemas.microsoft.com/office/drawing/2014/main" xmlns="" id="{DCF44781-E941-421E-89BE-0ABCA37EDACB}"/>
               </a:ext>
             </a:extLst>
           </p:cNvPr>
@@ -19674,7 +19673,7 @@
           <p:cNvPr id="105" name="TextBox 104">
             <a:extLst>
               <a:ext uri="{FF2B5EF4-FFF2-40B4-BE49-F238E27FC236}">
-                <a16:creationId xmlns="" xmlns:a16="http://schemas.microsoft.com/office/drawing/2014/main" id="{E2424417-DD1B-4E8D-A2A5-F034A489C27A}"/>
+                <a16:creationId xmlns:a16="http://schemas.microsoft.com/office/drawing/2014/main" xmlns="" id="{E2424417-DD1B-4E8D-A2A5-F034A489C27A}"/>
               </a:ext>
             </a:extLst>
           </p:cNvPr>
@@ -19727,7 +19726,7 @@
           <p:cNvPr id="106" name="TextBox 105">
             <a:extLst>
               <a:ext uri="{FF2B5EF4-FFF2-40B4-BE49-F238E27FC236}">
-                <a16:creationId xmlns="" xmlns:a16="http://schemas.microsoft.com/office/drawing/2014/main" id="{226BC8B6-2411-443E-BEE4-F24BDE166FA2}"/>
+                <a16:creationId xmlns:a16="http://schemas.microsoft.com/office/drawing/2014/main" xmlns="" id="{226BC8B6-2411-443E-BEE4-F24BDE166FA2}"/>
               </a:ext>
             </a:extLst>
           </p:cNvPr>
@@ -19780,7 +19779,7 @@
           <p:cNvPr id="107" name="TextBox 106">
             <a:extLst>
               <a:ext uri="{FF2B5EF4-FFF2-40B4-BE49-F238E27FC236}">
-                <a16:creationId xmlns="" xmlns:a16="http://schemas.microsoft.com/office/drawing/2014/main" id="{53330DED-8238-48AB-B79C-3155945E34EF}"/>
+                <a16:creationId xmlns:a16="http://schemas.microsoft.com/office/drawing/2014/main" xmlns="" id="{53330DED-8238-48AB-B79C-3155945E34EF}"/>
               </a:ext>
             </a:extLst>
           </p:cNvPr>
@@ -19847,7 +19846,7 @@
           <p:cNvPr id="108" name="TextBox 107">
             <a:extLst>
               <a:ext uri="{FF2B5EF4-FFF2-40B4-BE49-F238E27FC236}">
-                <a16:creationId xmlns="" xmlns:a16="http://schemas.microsoft.com/office/drawing/2014/main" id="{53330DED-8238-48AB-B79C-3155945E34EF}"/>
+                <a16:creationId xmlns:a16="http://schemas.microsoft.com/office/drawing/2014/main" xmlns="" id="{53330DED-8238-48AB-B79C-3155945E34EF}"/>
               </a:ext>
             </a:extLst>
           </p:cNvPr>
@@ -19914,7 +19913,7 @@
           <p:cNvPr id="110" name="Straight Arrow Connector 109">
             <a:extLst>
               <a:ext uri="{FF2B5EF4-FFF2-40B4-BE49-F238E27FC236}">
-                <a16:creationId xmlns="" xmlns:a16="http://schemas.microsoft.com/office/drawing/2014/main" id="{D5D1DDE3-D551-4E6B-AD34-6FBA1762CCD0}"/>
+                <a16:creationId xmlns:a16="http://schemas.microsoft.com/office/drawing/2014/main" xmlns="" id="{D5D1DDE3-D551-4E6B-AD34-6FBA1762CCD0}"/>
               </a:ext>
             </a:extLst>
           </p:cNvPr>
@@ -20026,7 +20025,7 @@
           <p:cNvPr id="47" name="TextBox 46">
             <a:extLst>
               <a:ext uri="{FF2B5EF4-FFF2-40B4-BE49-F238E27FC236}">
-                <a16:creationId xmlns="" xmlns:a16="http://schemas.microsoft.com/office/drawing/2014/main" id="{226BC8B6-2411-443E-BEE4-F24BDE166FA2}"/>
+                <a16:creationId xmlns:a16="http://schemas.microsoft.com/office/drawing/2014/main" xmlns="" id="{226BC8B6-2411-443E-BEE4-F24BDE166FA2}"/>
               </a:ext>
             </a:extLst>
           </p:cNvPr>
@@ -20291,7 +20290,7 @@
           <p:cNvPr id="2" name="Text Placeholder 1">
             <a:extLst>
               <a:ext uri="{FF2B5EF4-FFF2-40B4-BE49-F238E27FC236}">
-                <a16:creationId xmlns="" xmlns:a16="http://schemas.microsoft.com/office/drawing/2014/main" id="{AFBCD827-6230-4B56-A635-5E675B7172C3}"/>
+                <a16:creationId xmlns:a16="http://schemas.microsoft.com/office/drawing/2014/main" xmlns="" id="{AFBCD827-6230-4B56-A635-5E675B7172C3}"/>
               </a:ext>
             </a:extLst>
           </p:cNvPr>
@@ -20367,7 +20366,7 @@
           <p:cNvPr id="3" name="Title 2">
             <a:extLst>
               <a:ext uri="{FF2B5EF4-FFF2-40B4-BE49-F238E27FC236}">
-                <a16:creationId xmlns="" xmlns:a16="http://schemas.microsoft.com/office/drawing/2014/main" id="{8BFE033C-14B0-479B-8763-B7CFF7FFF22C}"/>
+                <a16:creationId xmlns:a16="http://schemas.microsoft.com/office/drawing/2014/main" xmlns="" id="{8BFE033C-14B0-479B-8763-B7CFF7FFF22C}"/>
               </a:ext>
             </a:extLst>
           </p:cNvPr>
@@ -20400,7 +20399,7 @@
           <p:cNvPr id="4" name="Slide Number Placeholder 3">
             <a:extLst>
               <a:ext uri="{FF2B5EF4-FFF2-40B4-BE49-F238E27FC236}">
-                <a16:creationId xmlns="" xmlns:a16="http://schemas.microsoft.com/office/drawing/2014/main" id="{4DCC1874-0B80-4127-8266-1B045C3CA889}"/>
+                <a16:creationId xmlns:a16="http://schemas.microsoft.com/office/drawing/2014/main" xmlns="" id="{4DCC1874-0B80-4127-8266-1B045C3CA889}"/>
               </a:ext>
             </a:extLst>
           </p:cNvPr>
@@ -20446,7 +20445,7 @@
           <p:cNvPr id="5" name="Text Placeholder 4">
             <a:extLst>
               <a:ext uri="{FF2B5EF4-FFF2-40B4-BE49-F238E27FC236}">
-                <a16:creationId xmlns="" xmlns:a16="http://schemas.microsoft.com/office/drawing/2014/main" id="{1996CBD5-7393-407C-BC99-C76D33D74AAF}"/>
+                <a16:creationId xmlns:a16="http://schemas.microsoft.com/office/drawing/2014/main" xmlns="" id="{1996CBD5-7393-407C-BC99-C76D33D74AAF}"/>
               </a:ext>
             </a:extLst>
           </p:cNvPr>
@@ -20733,7 +20732,7 @@
           <p:cNvPr id="3" name="Title 2">
             <a:extLst>
               <a:ext uri="{FF2B5EF4-FFF2-40B4-BE49-F238E27FC236}">
-                <a16:creationId xmlns="" xmlns:a16="http://schemas.microsoft.com/office/drawing/2014/main" id="{A8704E41-3486-46BD-8AA7-B6B5D28F95A5}"/>
+                <a16:creationId xmlns:a16="http://schemas.microsoft.com/office/drawing/2014/main" xmlns="" id="{A8704E41-3486-46BD-8AA7-B6B5D28F95A5}"/>
               </a:ext>
             </a:extLst>
           </p:cNvPr>
@@ -20774,7 +20773,7 @@
           <p:cNvPr id="4" name="Slide Number Placeholder 3">
             <a:extLst>
               <a:ext uri="{FF2B5EF4-FFF2-40B4-BE49-F238E27FC236}">
-                <a16:creationId xmlns="" xmlns:a16="http://schemas.microsoft.com/office/drawing/2014/main" id="{02CD92EA-E9CB-4F4C-B1B9-840F11B55DC5}"/>
+                <a16:creationId xmlns:a16="http://schemas.microsoft.com/office/drawing/2014/main" xmlns="" id="{02CD92EA-E9CB-4F4C-B1B9-840F11B55DC5}"/>
               </a:ext>
             </a:extLst>
           </p:cNvPr>
@@ -20820,7 +20819,7 @@
           <p:cNvPr id="5" name="Text Placeholder 4">
             <a:extLst>
               <a:ext uri="{FF2B5EF4-FFF2-40B4-BE49-F238E27FC236}">
-                <a16:creationId xmlns="" xmlns:a16="http://schemas.microsoft.com/office/drawing/2014/main" id="{C22D9F79-04C1-4762-96D6-F3FE8172F1B1}"/>
+                <a16:creationId xmlns:a16="http://schemas.microsoft.com/office/drawing/2014/main" xmlns="" id="{C22D9F79-04C1-4762-96D6-F3FE8172F1B1}"/>
               </a:ext>
             </a:extLst>
           </p:cNvPr>
@@ -20845,7 +20844,7 @@
           <p:cNvPr id="29" name="Oval 28">
             <a:extLst>
               <a:ext uri="{FF2B5EF4-FFF2-40B4-BE49-F238E27FC236}">
-                <a16:creationId xmlns="" xmlns:a16="http://schemas.microsoft.com/office/drawing/2014/main" id="{70018B8E-C8EA-4592-B666-4DD6915C2DAF}"/>
+                <a16:creationId xmlns:a16="http://schemas.microsoft.com/office/drawing/2014/main" xmlns="" id="{70018B8E-C8EA-4592-B666-4DD6915C2DAF}"/>
               </a:ext>
             </a:extLst>
           </p:cNvPr>
@@ -20901,7 +20900,7 @@
           <p:cNvPr id="32" name="Straight Arrow Connector 31">
             <a:extLst>
               <a:ext uri="{FF2B5EF4-FFF2-40B4-BE49-F238E27FC236}">
-                <a16:creationId xmlns="" xmlns:a16="http://schemas.microsoft.com/office/drawing/2014/main" id="{D5D1DDE3-D551-4E6B-AD34-6FBA1762CCD0}"/>
+                <a16:creationId xmlns:a16="http://schemas.microsoft.com/office/drawing/2014/main" xmlns="" id="{D5D1DDE3-D551-4E6B-AD34-6FBA1762CCD0}"/>
               </a:ext>
             </a:extLst>
           </p:cNvPr>
@@ -20945,7 +20944,7 @@
           <p:cNvPr id="34" name="TextBox 33">
             <a:extLst>
               <a:ext uri="{FF2B5EF4-FFF2-40B4-BE49-F238E27FC236}">
-                <a16:creationId xmlns="" xmlns:a16="http://schemas.microsoft.com/office/drawing/2014/main" id="{EA7F15EB-6AA1-4C76-921F-2B04B74B1885}"/>
+                <a16:creationId xmlns:a16="http://schemas.microsoft.com/office/drawing/2014/main" xmlns="" id="{EA7F15EB-6AA1-4C76-921F-2B04B74B1885}"/>
               </a:ext>
             </a:extLst>
           </p:cNvPr>
@@ -20987,7 +20986,7 @@
           <p:cNvPr id="53" name="Oval 52">
             <a:extLst>
               <a:ext uri="{FF2B5EF4-FFF2-40B4-BE49-F238E27FC236}">
-                <a16:creationId xmlns="" xmlns:a16="http://schemas.microsoft.com/office/drawing/2014/main" id="{70018B8E-C8EA-4592-B666-4DD6915C2DAF}"/>
+                <a16:creationId xmlns:a16="http://schemas.microsoft.com/office/drawing/2014/main" xmlns="" id="{70018B8E-C8EA-4592-B666-4DD6915C2DAF}"/>
               </a:ext>
             </a:extLst>
           </p:cNvPr>
@@ -21043,7 +21042,7 @@
           <p:cNvPr id="57" name="Straight Arrow Connector 56">
             <a:extLst>
               <a:ext uri="{FF2B5EF4-FFF2-40B4-BE49-F238E27FC236}">
-                <a16:creationId xmlns="" xmlns:a16="http://schemas.microsoft.com/office/drawing/2014/main" id="{D5D1DDE3-D551-4E6B-AD34-6FBA1762CCD0}"/>
+                <a16:creationId xmlns:a16="http://schemas.microsoft.com/office/drawing/2014/main" xmlns="" id="{D5D1DDE3-D551-4E6B-AD34-6FBA1762CCD0}"/>
               </a:ext>
             </a:extLst>
           </p:cNvPr>
@@ -21087,7 +21086,7 @@
           <p:cNvPr id="59" name="TextBox 58">
             <a:extLst>
               <a:ext uri="{FF2B5EF4-FFF2-40B4-BE49-F238E27FC236}">
-                <a16:creationId xmlns="" xmlns:a16="http://schemas.microsoft.com/office/drawing/2014/main" id="{EA7F15EB-6AA1-4C76-921F-2B04B74B1885}"/>
+                <a16:creationId xmlns:a16="http://schemas.microsoft.com/office/drawing/2014/main" xmlns="" id="{EA7F15EB-6AA1-4C76-921F-2B04B74B1885}"/>
               </a:ext>
             </a:extLst>
           </p:cNvPr>
@@ -21129,7 +21128,7 @@
           <p:cNvPr id="60" name="Oval 59">
             <a:extLst>
               <a:ext uri="{FF2B5EF4-FFF2-40B4-BE49-F238E27FC236}">
-                <a16:creationId xmlns="" xmlns:a16="http://schemas.microsoft.com/office/drawing/2014/main" id="{70018B8E-C8EA-4592-B666-4DD6915C2DAF}"/>
+                <a16:creationId xmlns:a16="http://schemas.microsoft.com/office/drawing/2014/main" xmlns="" id="{70018B8E-C8EA-4592-B666-4DD6915C2DAF}"/>
               </a:ext>
             </a:extLst>
           </p:cNvPr>
@@ -21185,7 +21184,7 @@
           <p:cNvPr id="61" name="Straight Arrow Connector 60">
             <a:extLst>
               <a:ext uri="{FF2B5EF4-FFF2-40B4-BE49-F238E27FC236}">
-                <a16:creationId xmlns="" xmlns:a16="http://schemas.microsoft.com/office/drawing/2014/main" id="{D5D1DDE3-D551-4E6B-AD34-6FBA1762CCD0}"/>
+                <a16:creationId xmlns:a16="http://schemas.microsoft.com/office/drawing/2014/main" xmlns="" id="{D5D1DDE3-D551-4E6B-AD34-6FBA1762CCD0}"/>
               </a:ext>
             </a:extLst>
           </p:cNvPr>
@@ -21229,7 +21228,7 @@
           <p:cNvPr id="62" name="TextBox 61">
             <a:extLst>
               <a:ext uri="{FF2B5EF4-FFF2-40B4-BE49-F238E27FC236}">
-                <a16:creationId xmlns="" xmlns:a16="http://schemas.microsoft.com/office/drawing/2014/main" id="{EA7F15EB-6AA1-4C76-921F-2B04B74B1885}"/>
+                <a16:creationId xmlns:a16="http://schemas.microsoft.com/office/drawing/2014/main" xmlns="" id="{EA7F15EB-6AA1-4C76-921F-2B04B74B1885}"/>
               </a:ext>
             </a:extLst>
           </p:cNvPr>
@@ -21271,7 +21270,7 @@
           <p:cNvPr id="63" name="Oval 62">
             <a:extLst>
               <a:ext uri="{FF2B5EF4-FFF2-40B4-BE49-F238E27FC236}">
-                <a16:creationId xmlns="" xmlns:a16="http://schemas.microsoft.com/office/drawing/2014/main" id="{70018B8E-C8EA-4592-B666-4DD6915C2DAF}"/>
+                <a16:creationId xmlns:a16="http://schemas.microsoft.com/office/drawing/2014/main" xmlns="" id="{70018B8E-C8EA-4592-B666-4DD6915C2DAF}"/>
               </a:ext>
             </a:extLst>
           </p:cNvPr>
@@ -21327,7 +21326,7 @@
           <p:cNvPr id="66" name="TextBox 65">
             <a:extLst>
               <a:ext uri="{FF2B5EF4-FFF2-40B4-BE49-F238E27FC236}">
-                <a16:creationId xmlns="" xmlns:a16="http://schemas.microsoft.com/office/drawing/2014/main" id="{EA7F15EB-6AA1-4C76-921F-2B04B74B1885}"/>
+                <a16:creationId xmlns:a16="http://schemas.microsoft.com/office/drawing/2014/main" xmlns="" id="{EA7F15EB-6AA1-4C76-921F-2B04B74B1885}"/>
               </a:ext>
             </a:extLst>
           </p:cNvPr>
@@ -21369,7 +21368,7 @@
           <p:cNvPr id="76" name="Oval 75">
             <a:extLst>
               <a:ext uri="{FF2B5EF4-FFF2-40B4-BE49-F238E27FC236}">
-                <a16:creationId xmlns="" xmlns:a16="http://schemas.microsoft.com/office/drawing/2014/main" id="{70018B8E-C8EA-4592-B666-4DD6915C2DAF}"/>
+                <a16:creationId xmlns:a16="http://schemas.microsoft.com/office/drawing/2014/main" xmlns="" id="{70018B8E-C8EA-4592-B666-4DD6915C2DAF}"/>
               </a:ext>
             </a:extLst>
           </p:cNvPr>
@@ -21425,7 +21424,7 @@
           <p:cNvPr id="77" name="TextBox 76">
             <a:extLst>
               <a:ext uri="{FF2B5EF4-FFF2-40B4-BE49-F238E27FC236}">
-                <a16:creationId xmlns="" xmlns:a16="http://schemas.microsoft.com/office/drawing/2014/main" id="{EA7F15EB-6AA1-4C76-921F-2B04B74B1885}"/>
+                <a16:creationId xmlns:a16="http://schemas.microsoft.com/office/drawing/2014/main" xmlns="" id="{EA7F15EB-6AA1-4C76-921F-2B04B74B1885}"/>
               </a:ext>
             </a:extLst>
           </p:cNvPr>
@@ -21467,7 +21466,7 @@
           <p:cNvPr id="87" name="Oval 86">
             <a:extLst>
               <a:ext uri="{FF2B5EF4-FFF2-40B4-BE49-F238E27FC236}">
-                <a16:creationId xmlns="" xmlns:a16="http://schemas.microsoft.com/office/drawing/2014/main" id="{70018B8E-C8EA-4592-B666-4DD6915C2DAF}"/>
+                <a16:creationId xmlns:a16="http://schemas.microsoft.com/office/drawing/2014/main" xmlns="" id="{70018B8E-C8EA-4592-B666-4DD6915C2DAF}"/>
               </a:ext>
             </a:extLst>
           </p:cNvPr>
@@ -21523,7 +21522,7 @@
           <p:cNvPr id="88" name="Straight Arrow Connector 87">
             <a:extLst>
               <a:ext uri="{FF2B5EF4-FFF2-40B4-BE49-F238E27FC236}">
-                <a16:creationId xmlns="" xmlns:a16="http://schemas.microsoft.com/office/drawing/2014/main" id="{D5D1DDE3-D551-4E6B-AD34-6FBA1762CCD0}"/>
+                <a16:creationId xmlns:a16="http://schemas.microsoft.com/office/drawing/2014/main" xmlns="" id="{D5D1DDE3-D551-4E6B-AD34-6FBA1762CCD0}"/>
               </a:ext>
             </a:extLst>
           </p:cNvPr>
@@ -21567,7 +21566,7 @@
           <p:cNvPr id="89" name="TextBox 88">
             <a:extLst>
               <a:ext uri="{FF2B5EF4-FFF2-40B4-BE49-F238E27FC236}">
-                <a16:creationId xmlns="" xmlns:a16="http://schemas.microsoft.com/office/drawing/2014/main" id="{EA7F15EB-6AA1-4C76-921F-2B04B74B1885}"/>
+                <a16:creationId xmlns:a16="http://schemas.microsoft.com/office/drawing/2014/main" xmlns="" id="{EA7F15EB-6AA1-4C76-921F-2B04B74B1885}"/>
               </a:ext>
             </a:extLst>
           </p:cNvPr>
@@ -21609,7 +21608,7 @@
           <p:cNvPr id="91" name="Oval 90">
             <a:extLst>
               <a:ext uri="{FF2B5EF4-FFF2-40B4-BE49-F238E27FC236}">
-                <a16:creationId xmlns="" xmlns:a16="http://schemas.microsoft.com/office/drawing/2014/main" id="{70018B8E-C8EA-4592-B666-4DD6915C2DAF}"/>
+                <a16:creationId xmlns:a16="http://schemas.microsoft.com/office/drawing/2014/main" xmlns="" id="{70018B8E-C8EA-4592-B666-4DD6915C2DAF}"/>
               </a:ext>
             </a:extLst>
           </p:cNvPr>
@@ -21665,7 +21664,7 @@
           <p:cNvPr id="92" name="Straight Arrow Connector 91">
             <a:extLst>
               <a:ext uri="{FF2B5EF4-FFF2-40B4-BE49-F238E27FC236}">
-                <a16:creationId xmlns="" xmlns:a16="http://schemas.microsoft.com/office/drawing/2014/main" id="{D5D1DDE3-D551-4E6B-AD34-6FBA1762CCD0}"/>
+                <a16:creationId xmlns:a16="http://schemas.microsoft.com/office/drawing/2014/main" xmlns="" id="{D5D1DDE3-D551-4E6B-AD34-6FBA1762CCD0}"/>
               </a:ext>
             </a:extLst>
           </p:cNvPr>
@@ -21709,7 +21708,7 @@
           <p:cNvPr id="93" name="TextBox 92">
             <a:extLst>
               <a:ext uri="{FF2B5EF4-FFF2-40B4-BE49-F238E27FC236}">
-                <a16:creationId xmlns="" xmlns:a16="http://schemas.microsoft.com/office/drawing/2014/main" id="{EA7F15EB-6AA1-4C76-921F-2B04B74B1885}"/>
+                <a16:creationId xmlns:a16="http://schemas.microsoft.com/office/drawing/2014/main" xmlns="" id="{EA7F15EB-6AA1-4C76-921F-2B04B74B1885}"/>
               </a:ext>
             </a:extLst>
           </p:cNvPr>
@@ -21751,7 +21750,7 @@
           <p:cNvPr id="94" name="Oval 93">
             <a:extLst>
               <a:ext uri="{FF2B5EF4-FFF2-40B4-BE49-F238E27FC236}">
-                <a16:creationId xmlns="" xmlns:a16="http://schemas.microsoft.com/office/drawing/2014/main" id="{70018B8E-C8EA-4592-B666-4DD6915C2DAF}"/>
+                <a16:creationId xmlns:a16="http://schemas.microsoft.com/office/drawing/2014/main" xmlns="" id="{70018B8E-C8EA-4592-B666-4DD6915C2DAF}"/>
               </a:ext>
             </a:extLst>
           </p:cNvPr>
@@ -21807,7 +21806,7 @@
           <p:cNvPr id="95" name="TextBox 94">
             <a:extLst>
               <a:ext uri="{FF2B5EF4-FFF2-40B4-BE49-F238E27FC236}">
-                <a16:creationId xmlns="" xmlns:a16="http://schemas.microsoft.com/office/drawing/2014/main" id="{EA7F15EB-6AA1-4C76-921F-2B04B74B1885}"/>
+                <a16:creationId xmlns:a16="http://schemas.microsoft.com/office/drawing/2014/main" xmlns="" id="{EA7F15EB-6AA1-4C76-921F-2B04B74B1885}"/>
               </a:ext>
             </a:extLst>
           </p:cNvPr>
@@ -21849,7 +21848,7 @@
           <p:cNvPr id="98" name="Straight Arrow Connector 97">
             <a:extLst>
               <a:ext uri="{FF2B5EF4-FFF2-40B4-BE49-F238E27FC236}">
-                <a16:creationId xmlns="" xmlns:a16="http://schemas.microsoft.com/office/drawing/2014/main" id="{D5D1DDE3-D551-4E6B-AD34-6FBA1762CCD0}"/>
+                <a16:creationId xmlns:a16="http://schemas.microsoft.com/office/drawing/2014/main" xmlns="" id="{D5D1DDE3-D551-4E6B-AD34-6FBA1762CCD0}"/>
               </a:ext>
             </a:extLst>
           </p:cNvPr>
@@ -21893,7 +21892,7 @@
           <p:cNvPr id="99" name="Straight Arrow Connector 98">
             <a:extLst>
               <a:ext uri="{FF2B5EF4-FFF2-40B4-BE49-F238E27FC236}">
-                <a16:creationId xmlns="" xmlns:a16="http://schemas.microsoft.com/office/drawing/2014/main" id="{D5D1DDE3-D551-4E6B-AD34-6FBA1762CCD0}"/>
+                <a16:creationId xmlns:a16="http://schemas.microsoft.com/office/drawing/2014/main" xmlns="" id="{D5D1DDE3-D551-4E6B-AD34-6FBA1762CCD0}"/>
               </a:ext>
             </a:extLst>
           </p:cNvPr>
@@ -21937,7 +21936,7 @@
           <p:cNvPr id="100" name="Straight Arrow Connector 99">
             <a:extLst>
               <a:ext uri="{FF2B5EF4-FFF2-40B4-BE49-F238E27FC236}">
-                <a16:creationId xmlns="" xmlns:a16="http://schemas.microsoft.com/office/drawing/2014/main" id="{D5D1DDE3-D551-4E6B-AD34-6FBA1762CCD0}"/>
+                <a16:creationId xmlns:a16="http://schemas.microsoft.com/office/drawing/2014/main" xmlns="" id="{D5D1DDE3-D551-4E6B-AD34-6FBA1762CCD0}"/>
               </a:ext>
             </a:extLst>
           </p:cNvPr>
@@ -21981,7 +21980,7 @@
           <p:cNvPr id="110" name="Straight Arrow Connector 109">
             <a:extLst>
               <a:ext uri="{FF2B5EF4-FFF2-40B4-BE49-F238E27FC236}">
-                <a16:creationId xmlns="" xmlns:a16="http://schemas.microsoft.com/office/drawing/2014/main" id="{D5D1DDE3-D551-4E6B-AD34-6FBA1762CCD0}"/>
+                <a16:creationId xmlns:a16="http://schemas.microsoft.com/office/drawing/2014/main" xmlns="" id="{D5D1DDE3-D551-4E6B-AD34-6FBA1762CCD0}"/>
               </a:ext>
             </a:extLst>
           </p:cNvPr>
@@ -22025,7 +22024,7 @@
           <p:cNvPr id="111" name="TextBox 110">
             <a:extLst>
               <a:ext uri="{FF2B5EF4-FFF2-40B4-BE49-F238E27FC236}">
-                <a16:creationId xmlns="" xmlns:a16="http://schemas.microsoft.com/office/drawing/2014/main" id="{DCF44781-E941-421E-89BE-0ABCA37EDACB}"/>
+                <a16:creationId xmlns:a16="http://schemas.microsoft.com/office/drawing/2014/main" xmlns="" id="{DCF44781-E941-421E-89BE-0ABCA37EDACB}"/>
               </a:ext>
             </a:extLst>
           </p:cNvPr>
@@ -22078,7 +22077,7 @@
           <p:cNvPr id="112" name="TextBox 111">
             <a:extLst>
               <a:ext uri="{FF2B5EF4-FFF2-40B4-BE49-F238E27FC236}">
-                <a16:creationId xmlns="" xmlns:a16="http://schemas.microsoft.com/office/drawing/2014/main" id="{E2424417-DD1B-4E8D-A2A5-F034A489C27A}"/>
+                <a16:creationId xmlns:a16="http://schemas.microsoft.com/office/drawing/2014/main" xmlns="" id="{E2424417-DD1B-4E8D-A2A5-F034A489C27A}"/>
               </a:ext>
             </a:extLst>
           </p:cNvPr>
@@ -22131,7 +22130,7 @@
           <p:cNvPr id="113" name="TextBox 112">
             <a:extLst>
               <a:ext uri="{FF2B5EF4-FFF2-40B4-BE49-F238E27FC236}">
-                <a16:creationId xmlns="" xmlns:a16="http://schemas.microsoft.com/office/drawing/2014/main" id="{226BC8B6-2411-443E-BEE4-F24BDE166FA2}"/>
+                <a16:creationId xmlns:a16="http://schemas.microsoft.com/office/drawing/2014/main" xmlns="" id="{226BC8B6-2411-443E-BEE4-F24BDE166FA2}"/>
               </a:ext>
             </a:extLst>
           </p:cNvPr>
@@ -22184,7 +22183,7 @@
           <p:cNvPr id="114" name="TextBox 113">
             <a:extLst>
               <a:ext uri="{FF2B5EF4-FFF2-40B4-BE49-F238E27FC236}">
-                <a16:creationId xmlns="" xmlns:a16="http://schemas.microsoft.com/office/drawing/2014/main" id="{53330DED-8238-48AB-B79C-3155945E34EF}"/>
+                <a16:creationId xmlns:a16="http://schemas.microsoft.com/office/drawing/2014/main" xmlns="" id="{53330DED-8238-48AB-B79C-3155945E34EF}"/>
               </a:ext>
             </a:extLst>
           </p:cNvPr>
@@ -22251,7 +22250,7 @@
           <p:cNvPr id="115" name="TextBox 114">
             <a:extLst>
               <a:ext uri="{FF2B5EF4-FFF2-40B4-BE49-F238E27FC236}">
-                <a16:creationId xmlns="" xmlns:a16="http://schemas.microsoft.com/office/drawing/2014/main" id="{53330DED-8238-48AB-B79C-3155945E34EF}"/>
+                <a16:creationId xmlns:a16="http://schemas.microsoft.com/office/drawing/2014/main" xmlns="" id="{53330DED-8238-48AB-B79C-3155945E34EF}"/>
               </a:ext>
             </a:extLst>
           </p:cNvPr>
@@ -22318,7 +22317,7 @@
           <p:cNvPr id="116" name="TextBox 115">
             <a:extLst>
               <a:ext uri="{FF2B5EF4-FFF2-40B4-BE49-F238E27FC236}">
-                <a16:creationId xmlns="" xmlns:a16="http://schemas.microsoft.com/office/drawing/2014/main" id="{226BC8B6-2411-443E-BEE4-F24BDE166FA2}"/>
+                <a16:creationId xmlns:a16="http://schemas.microsoft.com/office/drawing/2014/main" xmlns="" id="{226BC8B6-2411-443E-BEE4-F24BDE166FA2}"/>
               </a:ext>
             </a:extLst>
           </p:cNvPr>
@@ -24260,7 +24259,7 @@
           <p:cNvPr id="2" name="Text Placeholder 1">
             <a:extLst>
               <a:ext uri="{FF2B5EF4-FFF2-40B4-BE49-F238E27FC236}">
-                <a16:creationId xmlns="" xmlns:a16="http://schemas.microsoft.com/office/drawing/2014/main" id="{A51E6A0F-3D6D-493A-B24E-4199D72942C9}"/>
+                <a16:creationId xmlns:a16="http://schemas.microsoft.com/office/drawing/2014/main" xmlns="" id="{A51E6A0F-3D6D-493A-B24E-4199D72942C9}"/>
               </a:ext>
             </a:extLst>
           </p:cNvPr>
@@ -24285,7 +24284,7 @@
           <p:cNvPr id="3" name="Title 2">
             <a:extLst>
               <a:ext uri="{FF2B5EF4-FFF2-40B4-BE49-F238E27FC236}">
-                <a16:creationId xmlns="" xmlns:a16="http://schemas.microsoft.com/office/drawing/2014/main" id="{A8704E41-3486-46BD-8AA7-B6B5D28F95A5}"/>
+                <a16:creationId xmlns:a16="http://schemas.microsoft.com/office/drawing/2014/main" xmlns="" id="{A8704E41-3486-46BD-8AA7-B6B5D28F95A5}"/>
               </a:ext>
             </a:extLst>
           </p:cNvPr>
@@ -24322,7 +24321,7 @@
           <p:cNvPr id="4" name="Slide Number Placeholder 3">
             <a:extLst>
               <a:ext uri="{FF2B5EF4-FFF2-40B4-BE49-F238E27FC236}">
-                <a16:creationId xmlns="" xmlns:a16="http://schemas.microsoft.com/office/drawing/2014/main" id="{02CD92EA-E9CB-4F4C-B1B9-840F11B55DC5}"/>
+                <a16:creationId xmlns:a16="http://schemas.microsoft.com/office/drawing/2014/main" xmlns="" id="{02CD92EA-E9CB-4F4C-B1B9-840F11B55DC5}"/>
               </a:ext>
             </a:extLst>
           </p:cNvPr>
@@ -24368,7 +24367,7 @@
           <p:cNvPr id="5" name="Text Placeholder 4">
             <a:extLst>
               <a:ext uri="{FF2B5EF4-FFF2-40B4-BE49-F238E27FC236}">
-                <a16:creationId xmlns="" xmlns:a16="http://schemas.microsoft.com/office/drawing/2014/main" id="{C22D9F79-04C1-4762-96D6-F3FE8172F1B1}"/>
+                <a16:creationId xmlns:a16="http://schemas.microsoft.com/office/drawing/2014/main" xmlns="" id="{C22D9F79-04C1-4762-96D6-F3FE8172F1B1}"/>
               </a:ext>
             </a:extLst>
           </p:cNvPr>
@@ -24385,7 +24384,7 @@
           <a:lstStyle/>
           <a:p>
             <a:r>
-              <a:rPr lang="en-US" b="0" dirty="0"/>
+              <a:rPr lang="en-US" dirty="0"/>
               <a:t>…a Persistent Map</a:t>
             </a:r>
           </a:p>
@@ -24396,7 +24395,7 @@
           <p:cNvPr id="8" name="Picture 7">
             <a:extLst>
               <a:ext uri="{FF2B5EF4-FFF2-40B4-BE49-F238E27FC236}">
-                <a16:creationId xmlns="" xmlns:a16="http://schemas.microsoft.com/office/drawing/2014/main" id="{FEF76D80-A1A2-40D3-8D23-AD9AE057D7AB}"/>
+                <a16:creationId xmlns:a16="http://schemas.microsoft.com/office/drawing/2014/main" xmlns="" id="{FEF76D80-A1A2-40D3-8D23-AD9AE057D7AB}"/>
               </a:ext>
             </a:extLst>
           </p:cNvPr>
@@ -24478,7 +24477,7 @@
           <p:cNvPr id="2" name="Text Placeholder 1">
             <a:extLst>
               <a:ext uri="{FF2B5EF4-FFF2-40B4-BE49-F238E27FC236}">
-                <a16:creationId xmlns="" xmlns:a16="http://schemas.microsoft.com/office/drawing/2014/main" id="{A51E6A0F-3D6D-493A-B24E-4199D72942C9}"/>
+                <a16:creationId xmlns:a16="http://schemas.microsoft.com/office/drawing/2014/main" xmlns="" id="{A51E6A0F-3D6D-493A-B24E-4199D72942C9}"/>
               </a:ext>
             </a:extLst>
           </p:cNvPr>
@@ -24503,7 +24502,7 @@
           <p:cNvPr id="3" name="Title 2">
             <a:extLst>
               <a:ext uri="{FF2B5EF4-FFF2-40B4-BE49-F238E27FC236}">
-                <a16:creationId xmlns="" xmlns:a16="http://schemas.microsoft.com/office/drawing/2014/main" id="{A8704E41-3486-46BD-8AA7-B6B5D28F95A5}"/>
+                <a16:creationId xmlns:a16="http://schemas.microsoft.com/office/drawing/2014/main" xmlns="" id="{A8704E41-3486-46BD-8AA7-B6B5D28F95A5}"/>
               </a:ext>
             </a:extLst>
           </p:cNvPr>
@@ -24540,7 +24539,7 @@
           <p:cNvPr id="4" name="Slide Number Placeholder 3">
             <a:extLst>
               <a:ext uri="{FF2B5EF4-FFF2-40B4-BE49-F238E27FC236}">
-                <a16:creationId xmlns="" xmlns:a16="http://schemas.microsoft.com/office/drawing/2014/main" id="{02CD92EA-E9CB-4F4C-B1B9-840F11B55DC5}"/>
+                <a16:creationId xmlns:a16="http://schemas.microsoft.com/office/drawing/2014/main" xmlns="" id="{02CD92EA-E9CB-4F4C-B1B9-840F11B55DC5}"/>
               </a:ext>
             </a:extLst>
           </p:cNvPr>
@@ -24586,7 +24585,7 @@
           <p:cNvPr id="5" name="Text Placeholder 4">
             <a:extLst>
               <a:ext uri="{FF2B5EF4-FFF2-40B4-BE49-F238E27FC236}">
-                <a16:creationId xmlns="" xmlns:a16="http://schemas.microsoft.com/office/drawing/2014/main" id="{C22D9F79-04C1-4762-96D6-F3FE8172F1B1}"/>
+                <a16:creationId xmlns:a16="http://schemas.microsoft.com/office/drawing/2014/main" xmlns="" id="{C22D9F79-04C1-4762-96D6-F3FE8172F1B1}"/>
               </a:ext>
             </a:extLst>
           </p:cNvPr>
@@ -24603,7 +24602,7 @@
           <a:lstStyle/>
           <a:p>
             <a:r>
-              <a:rPr lang="en-US" b="0" dirty="0"/>
+              <a:rPr lang="en-US" dirty="0"/>
               <a:t>…a Stupid Content Tracker</a:t>
             </a:r>
           </a:p>
@@ -24614,7 +24613,7 @@
           <p:cNvPr id="8" name="Picture 7">
             <a:extLst>
               <a:ext uri="{FF2B5EF4-FFF2-40B4-BE49-F238E27FC236}">
-                <a16:creationId xmlns="" xmlns:a16="http://schemas.microsoft.com/office/drawing/2014/main" id="{F11A34E2-CF14-4FAC-9913-4CAC796E46FA}"/>
+                <a16:creationId xmlns:a16="http://schemas.microsoft.com/office/drawing/2014/main" xmlns="" id="{F11A34E2-CF14-4FAC-9913-4CAC796E46FA}"/>
               </a:ext>
             </a:extLst>
           </p:cNvPr>
@@ -24696,7 +24695,7 @@
           <p:cNvPr id="2" name="Text Placeholder 1">
             <a:extLst>
               <a:ext uri="{FF2B5EF4-FFF2-40B4-BE49-F238E27FC236}">
-                <a16:creationId xmlns="" xmlns:a16="http://schemas.microsoft.com/office/drawing/2014/main" id="{4027774C-85B3-4216-BE8E-2076F29E4ECA}"/>
+                <a16:creationId xmlns:a16="http://schemas.microsoft.com/office/drawing/2014/main" xmlns="" id="{4027774C-85B3-4216-BE8E-2076F29E4ECA}"/>
               </a:ext>
             </a:extLst>
           </p:cNvPr>
@@ -24814,7 +24813,7 @@
           <p:cNvPr id="3" name="Title 2">
             <a:extLst>
               <a:ext uri="{FF2B5EF4-FFF2-40B4-BE49-F238E27FC236}">
-                <a16:creationId xmlns="" xmlns:a16="http://schemas.microsoft.com/office/drawing/2014/main" id="{9C17F15E-A1DD-464A-AA9B-38A9BA78B322}"/>
+                <a16:creationId xmlns:a16="http://schemas.microsoft.com/office/drawing/2014/main" xmlns="" id="{9C17F15E-A1DD-464A-AA9B-38A9BA78B322}"/>
               </a:ext>
             </a:extLst>
           </p:cNvPr>
@@ -24850,7 +24849,7 @@
           <p:cNvPr id="4" name="Slide Number Placeholder 3">
             <a:extLst>
               <a:ext uri="{FF2B5EF4-FFF2-40B4-BE49-F238E27FC236}">
-                <a16:creationId xmlns="" xmlns:a16="http://schemas.microsoft.com/office/drawing/2014/main" id="{F3AFDCA3-1E95-4F76-9D6E-91F47D013419}"/>
+                <a16:creationId xmlns:a16="http://schemas.microsoft.com/office/drawing/2014/main" xmlns="" id="{F3AFDCA3-1E95-4F76-9D6E-91F47D013419}"/>
               </a:ext>
             </a:extLst>
           </p:cNvPr>
@@ -24896,7 +24895,7 @@
           <p:cNvPr id="5" name="Text Placeholder 4">
             <a:extLst>
               <a:ext uri="{FF2B5EF4-FFF2-40B4-BE49-F238E27FC236}">
-                <a16:creationId xmlns="" xmlns:a16="http://schemas.microsoft.com/office/drawing/2014/main" id="{34BFDC6A-5D6A-42B9-82C2-84BD9E5DCCC0}"/>
+                <a16:creationId xmlns:a16="http://schemas.microsoft.com/office/drawing/2014/main" xmlns="" id="{34BFDC6A-5D6A-42B9-82C2-84BD9E5DCCC0}"/>
               </a:ext>
             </a:extLst>
           </p:cNvPr>
@@ -24921,7 +24920,7 @@
           <p:cNvPr id="7" name="Text Placeholder 1">
             <a:extLst>
               <a:ext uri="{FF2B5EF4-FFF2-40B4-BE49-F238E27FC236}">
-                <a16:creationId xmlns="" xmlns:a16="http://schemas.microsoft.com/office/drawing/2014/main" id="{4027774C-85B3-4216-BE8E-2076F29E4ECA}"/>
+                <a16:creationId xmlns:a16="http://schemas.microsoft.com/office/drawing/2014/main" xmlns="" id="{4027774C-85B3-4216-BE8E-2076F29E4ECA}"/>
               </a:ext>
             </a:extLst>
           </p:cNvPr>
@@ -25775,7 +25774,7 @@
           <p:cNvPr id="2" name="Text Placeholder 1">
             <a:extLst>
               <a:ext uri="{FF2B5EF4-FFF2-40B4-BE49-F238E27FC236}">
-                <a16:creationId xmlns="" xmlns:a16="http://schemas.microsoft.com/office/drawing/2014/main" id="{4027774C-85B3-4216-BE8E-2076F29E4ECA}"/>
+                <a16:creationId xmlns:a16="http://schemas.microsoft.com/office/drawing/2014/main" xmlns="" id="{4027774C-85B3-4216-BE8E-2076F29E4ECA}"/>
               </a:ext>
             </a:extLst>
           </p:cNvPr>
@@ -25858,7 +25857,7 @@
           <p:cNvPr id="3" name="Title 2">
             <a:extLst>
               <a:ext uri="{FF2B5EF4-FFF2-40B4-BE49-F238E27FC236}">
-                <a16:creationId xmlns="" xmlns:a16="http://schemas.microsoft.com/office/drawing/2014/main" id="{9C17F15E-A1DD-464A-AA9B-38A9BA78B322}"/>
+                <a16:creationId xmlns:a16="http://schemas.microsoft.com/office/drawing/2014/main" xmlns="" id="{9C17F15E-A1DD-464A-AA9B-38A9BA78B322}"/>
               </a:ext>
             </a:extLst>
           </p:cNvPr>
@@ -25894,7 +25893,7 @@
           <p:cNvPr id="4" name="Slide Number Placeholder 3">
             <a:extLst>
               <a:ext uri="{FF2B5EF4-FFF2-40B4-BE49-F238E27FC236}">
-                <a16:creationId xmlns="" xmlns:a16="http://schemas.microsoft.com/office/drawing/2014/main" id="{F3AFDCA3-1E95-4F76-9D6E-91F47D013419}"/>
+                <a16:creationId xmlns:a16="http://schemas.microsoft.com/office/drawing/2014/main" xmlns="" id="{F3AFDCA3-1E95-4F76-9D6E-91F47D013419}"/>
               </a:ext>
             </a:extLst>
           </p:cNvPr>
@@ -25940,7 +25939,7 @@
           <p:cNvPr id="5" name="Text Placeholder 4">
             <a:extLst>
               <a:ext uri="{FF2B5EF4-FFF2-40B4-BE49-F238E27FC236}">
-                <a16:creationId xmlns="" xmlns:a16="http://schemas.microsoft.com/office/drawing/2014/main" id="{34BFDC6A-5D6A-42B9-82C2-84BD9E5DCCC0}"/>
+                <a16:creationId xmlns:a16="http://schemas.microsoft.com/office/drawing/2014/main" xmlns="" id="{34BFDC6A-5D6A-42B9-82C2-84BD9E5DCCC0}"/>
               </a:ext>
             </a:extLst>
           </p:cNvPr>
@@ -25965,7 +25964,7 @@
           <p:cNvPr id="6" name="Text Placeholder 1">
             <a:extLst>
               <a:ext uri="{FF2B5EF4-FFF2-40B4-BE49-F238E27FC236}">
-                <a16:creationId xmlns="" xmlns:a16="http://schemas.microsoft.com/office/drawing/2014/main" id="{94435B3C-163F-4575-9C37-A9B599E644AB}"/>
+                <a16:creationId xmlns:a16="http://schemas.microsoft.com/office/drawing/2014/main" xmlns="" id="{94435B3C-163F-4575-9C37-A9B599E644AB}"/>
               </a:ext>
             </a:extLst>
           </p:cNvPr>
@@ -26415,7 +26414,7 @@
           <p:cNvPr id="2" name="Title 1">
             <a:extLst>
               <a:ext uri="{FF2B5EF4-FFF2-40B4-BE49-F238E27FC236}">
-                <a16:creationId xmlns="" xmlns:a16="http://schemas.microsoft.com/office/drawing/2014/main" id="{C14F0455-9ED9-4652-8FD6-9C284BE2F092}"/>
+                <a16:creationId xmlns:a16="http://schemas.microsoft.com/office/drawing/2014/main" xmlns="" id="{C14F0455-9ED9-4652-8FD6-9C284BE2F092}"/>
               </a:ext>
             </a:extLst>
           </p:cNvPr>
@@ -26462,7 +26461,7 @@
           <p:cNvPr id="3" name="Text Placeholder 2">
             <a:extLst>
               <a:ext uri="{FF2B5EF4-FFF2-40B4-BE49-F238E27FC236}">
-                <a16:creationId xmlns="" xmlns:a16="http://schemas.microsoft.com/office/drawing/2014/main" id="{8136025E-6B8D-4575-9E2B-B0AAB8CAC233}"/>
+                <a16:creationId xmlns:a16="http://schemas.microsoft.com/office/drawing/2014/main" xmlns="" id="{8136025E-6B8D-4575-9E2B-B0AAB8CAC233}"/>
               </a:ext>
             </a:extLst>
           </p:cNvPr>
@@ -26545,11 +26544,7 @@
             </a:r>
             <a:r>
               <a:rPr lang="fr-FR" sz="2400" dirty="0" smtClean="0"/>
-              <a:t> </a:t>
-            </a:r>
-            <a:r>
-              <a:rPr lang="fr-FR" sz="2400" dirty="0" smtClean="0"/>
-              <a:t>Git </a:t>
+              <a:t> Git </a:t>
             </a:r>
             <a:r>
               <a:rPr lang="fr-FR" sz="2400" dirty="0" err="1" smtClean="0"/>
@@ -26615,10 +26610,12 @@
         </p:nvSpPr>
         <p:spPr/>
         <p:txBody>
-          <a:bodyPr/>
+          <a:bodyPr>
+            <a:normAutofit/>
+          </a:bodyPr>
           <a:lstStyle/>
           <a:p>
-            <a:endParaRPr lang="fr-FR"/>
+            <a:endParaRPr lang="fr-FR" sz="1600" dirty="0"/>
           </a:p>
         </p:txBody>
       </p:sp>
@@ -26692,7 +26689,7 @@
           <p:cNvPr id="8" name="Picture 7">
             <a:extLst>
               <a:ext uri="{FF2B5EF4-FFF2-40B4-BE49-F238E27FC236}">
-                <a16:creationId xmlns="" xmlns:a16="http://schemas.microsoft.com/office/drawing/2014/main" id="{E008011F-F481-44B1-A7AA-A403E3E4CC96}"/>
+                <a16:creationId xmlns:a16="http://schemas.microsoft.com/office/drawing/2014/main" xmlns="" id="{E008011F-F481-44B1-A7AA-A403E3E4CC96}"/>
               </a:ext>
             </a:extLst>
           </p:cNvPr>
@@ -26843,7 +26840,7 @@
           <p:cNvPr id="2" name="Text Placeholder 1">
             <a:extLst>
               <a:ext uri="{FF2B5EF4-FFF2-40B4-BE49-F238E27FC236}">
-                <a16:creationId xmlns="" xmlns:a16="http://schemas.microsoft.com/office/drawing/2014/main" id="{A51E6A0F-3D6D-493A-B24E-4199D72942C9}"/>
+                <a16:creationId xmlns:a16="http://schemas.microsoft.com/office/drawing/2014/main" xmlns="" id="{A51E6A0F-3D6D-493A-B24E-4199D72942C9}"/>
               </a:ext>
             </a:extLst>
           </p:cNvPr>
@@ -26868,7 +26865,7 @@
           <p:cNvPr id="3" name="Title 2">
             <a:extLst>
               <a:ext uri="{FF2B5EF4-FFF2-40B4-BE49-F238E27FC236}">
-                <a16:creationId xmlns="" xmlns:a16="http://schemas.microsoft.com/office/drawing/2014/main" id="{A8704E41-3486-46BD-8AA7-B6B5D28F95A5}"/>
+                <a16:creationId xmlns:a16="http://schemas.microsoft.com/office/drawing/2014/main" xmlns="" id="{A8704E41-3486-46BD-8AA7-B6B5D28F95A5}"/>
               </a:ext>
             </a:extLst>
           </p:cNvPr>
@@ -26905,7 +26902,7 @@
           <p:cNvPr id="4" name="Slide Number Placeholder 3">
             <a:extLst>
               <a:ext uri="{FF2B5EF4-FFF2-40B4-BE49-F238E27FC236}">
-                <a16:creationId xmlns="" xmlns:a16="http://schemas.microsoft.com/office/drawing/2014/main" id="{02CD92EA-E9CB-4F4C-B1B9-840F11B55DC5}"/>
+                <a16:creationId xmlns:a16="http://schemas.microsoft.com/office/drawing/2014/main" xmlns="" id="{02CD92EA-E9CB-4F4C-B1B9-840F11B55DC5}"/>
               </a:ext>
             </a:extLst>
           </p:cNvPr>
@@ -26951,7 +26948,7 @@
           <p:cNvPr id="5" name="Text Placeholder 4">
             <a:extLst>
               <a:ext uri="{FF2B5EF4-FFF2-40B4-BE49-F238E27FC236}">
-                <a16:creationId xmlns="" xmlns:a16="http://schemas.microsoft.com/office/drawing/2014/main" id="{C22D9F79-04C1-4762-96D6-F3FE8172F1B1}"/>
+                <a16:creationId xmlns:a16="http://schemas.microsoft.com/office/drawing/2014/main" xmlns="" id="{C22D9F79-04C1-4762-96D6-F3FE8172F1B1}"/>
               </a:ext>
             </a:extLst>
           </p:cNvPr>
@@ -26968,7 +26965,7 @@
           <a:lstStyle/>
           <a:p>
             <a:r>
-              <a:rPr lang="en-US" b="0" dirty="0"/>
+              <a:rPr lang="en-US" dirty="0"/>
               <a:t>…a Distributed Revision Control System</a:t>
             </a:r>
           </a:p>
@@ -26979,7 +26976,7 @@
           <p:cNvPr id="7" name="Picture 6">
             <a:extLst>
               <a:ext uri="{FF2B5EF4-FFF2-40B4-BE49-F238E27FC236}">
-                <a16:creationId xmlns="" xmlns:a16="http://schemas.microsoft.com/office/drawing/2014/main" id="{E008011F-F481-44B1-A7AA-A403E3E4CC96}"/>
+                <a16:creationId xmlns:a16="http://schemas.microsoft.com/office/drawing/2014/main" xmlns="" id="{E008011F-F481-44B1-A7AA-A403E3E4CC96}"/>
               </a:ext>
             </a:extLst>
           </p:cNvPr>
@@ -27063,7 +27060,7 @@
           <p:cNvPr id="2" name="Text Placeholder 1">
             <a:extLst>
               <a:ext uri="{FF2B5EF4-FFF2-40B4-BE49-F238E27FC236}">
-                <a16:creationId xmlns="" xmlns:a16="http://schemas.microsoft.com/office/drawing/2014/main" id="{A51E6A0F-3D6D-493A-B24E-4199D72942C9}"/>
+                <a16:creationId xmlns:a16="http://schemas.microsoft.com/office/drawing/2014/main" xmlns="" id="{A51E6A0F-3D6D-493A-B24E-4199D72942C9}"/>
               </a:ext>
             </a:extLst>
           </p:cNvPr>
@@ -27088,7 +27085,7 @@
           <p:cNvPr id="3" name="Title 2">
             <a:extLst>
               <a:ext uri="{FF2B5EF4-FFF2-40B4-BE49-F238E27FC236}">
-                <a16:creationId xmlns="" xmlns:a16="http://schemas.microsoft.com/office/drawing/2014/main" id="{A8704E41-3486-46BD-8AA7-B6B5D28F95A5}"/>
+                <a16:creationId xmlns:a16="http://schemas.microsoft.com/office/drawing/2014/main" xmlns="" id="{A8704E41-3486-46BD-8AA7-B6B5D28F95A5}"/>
               </a:ext>
             </a:extLst>
           </p:cNvPr>
@@ -27125,7 +27122,7 @@
           <p:cNvPr id="4" name="Slide Number Placeholder 3">
             <a:extLst>
               <a:ext uri="{FF2B5EF4-FFF2-40B4-BE49-F238E27FC236}">
-                <a16:creationId xmlns="" xmlns:a16="http://schemas.microsoft.com/office/drawing/2014/main" id="{02CD92EA-E9CB-4F4C-B1B9-840F11B55DC5}"/>
+                <a16:creationId xmlns:a16="http://schemas.microsoft.com/office/drawing/2014/main" xmlns="" id="{02CD92EA-E9CB-4F4C-B1B9-840F11B55DC5}"/>
               </a:ext>
             </a:extLst>
           </p:cNvPr>
@@ -27171,7 +27168,7 @@
           <p:cNvPr id="5" name="Text Placeholder 4">
             <a:extLst>
               <a:ext uri="{FF2B5EF4-FFF2-40B4-BE49-F238E27FC236}">
-                <a16:creationId xmlns="" xmlns:a16="http://schemas.microsoft.com/office/drawing/2014/main" id="{C22D9F79-04C1-4762-96D6-F3FE8172F1B1}"/>
+                <a16:creationId xmlns:a16="http://schemas.microsoft.com/office/drawing/2014/main" xmlns="" id="{C22D9F79-04C1-4762-96D6-F3FE8172F1B1}"/>
               </a:ext>
             </a:extLst>
           </p:cNvPr>
@@ -27188,7 +27185,7 @@
           <a:lstStyle/>
           <a:p>
             <a:r>
-              <a:rPr lang="en-US" b="0" dirty="0"/>
+              <a:rPr lang="en-US" dirty="0"/>
               <a:t>…a Revision Control System</a:t>
             </a:r>
           </a:p>
@@ -27199,7 +27196,7 @@
           <p:cNvPr id="8" name="Picture 7">
             <a:extLst>
               <a:ext uri="{FF2B5EF4-FFF2-40B4-BE49-F238E27FC236}">
-                <a16:creationId xmlns="" xmlns:a16="http://schemas.microsoft.com/office/drawing/2014/main" id="{C62C63E2-C97A-4E3E-9C28-351D24FBB5BD}"/>
+                <a16:creationId xmlns:a16="http://schemas.microsoft.com/office/drawing/2014/main" xmlns="" id="{C62C63E2-C97A-4E3E-9C28-351D24FBB5BD}"/>
               </a:ext>
             </a:extLst>
           </p:cNvPr>
@@ -27281,7 +27278,7 @@
           <p:cNvPr id="2" name="Text Placeholder 1">
             <a:extLst>
               <a:ext uri="{FF2B5EF4-FFF2-40B4-BE49-F238E27FC236}">
-                <a16:creationId xmlns="" xmlns:a16="http://schemas.microsoft.com/office/drawing/2014/main" id="{A51E6A0F-3D6D-493A-B24E-4199D72942C9}"/>
+                <a16:creationId xmlns:a16="http://schemas.microsoft.com/office/drawing/2014/main" xmlns="" id="{A51E6A0F-3D6D-493A-B24E-4199D72942C9}"/>
               </a:ext>
             </a:extLst>
           </p:cNvPr>
@@ -27306,7 +27303,7 @@
           <p:cNvPr id="3" name="Title 2">
             <a:extLst>
               <a:ext uri="{FF2B5EF4-FFF2-40B4-BE49-F238E27FC236}">
-                <a16:creationId xmlns="" xmlns:a16="http://schemas.microsoft.com/office/drawing/2014/main" id="{A8704E41-3486-46BD-8AA7-B6B5D28F95A5}"/>
+                <a16:creationId xmlns:a16="http://schemas.microsoft.com/office/drawing/2014/main" xmlns="" id="{A8704E41-3486-46BD-8AA7-B6B5D28F95A5}"/>
               </a:ext>
             </a:extLst>
           </p:cNvPr>
@@ -27343,7 +27340,7 @@
           <p:cNvPr id="4" name="Slide Number Placeholder 3">
             <a:extLst>
               <a:ext uri="{FF2B5EF4-FFF2-40B4-BE49-F238E27FC236}">
-                <a16:creationId xmlns="" xmlns:a16="http://schemas.microsoft.com/office/drawing/2014/main" id="{02CD92EA-E9CB-4F4C-B1B9-840F11B55DC5}"/>
+                <a16:creationId xmlns:a16="http://schemas.microsoft.com/office/drawing/2014/main" xmlns="" id="{02CD92EA-E9CB-4F4C-B1B9-840F11B55DC5}"/>
               </a:ext>
             </a:extLst>
           </p:cNvPr>
@@ -27389,7 +27386,7 @@
           <p:cNvPr id="5" name="Text Placeholder 4">
             <a:extLst>
               <a:ext uri="{FF2B5EF4-FFF2-40B4-BE49-F238E27FC236}">
-                <a16:creationId xmlns="" xmlns:a16="http://schemas.microsoft.com/office/drawing/2014/main" id="{C22D9F79-04C1-4762-96D6-F3FE8172F1B1}"/>
+                <a16:creationId xmlns:a16="http://schemas.microsoft.com/office/drawing/2014/main" xmlns="" id="{C22D9F79-04C1-4762-96D6-F3FE8172F1B1}"/>
               </a:ext>
             </a:extLst>
           </p:cNvPr>
@@ -27406,7 +27403,7 @@
           <a:lstStyle/>
           <a:p>
             <a:r>
-              <a:rPr lang="en-US" b="0" dirty="0"/>
+              <a:rPr lang="en-US" dirty="0"/>
               <a:t>…a Stupid Content Tracker</a:t>
             </a:r>
           </a:p>
@@ -27417,7 +27414,7 @@
           <p:cNvPr id="8" name="Picture 7">
             <a:extLst>
               <a:ext uri="{FF2B5EF4-FFF2-40B4-BE49-F238E27FC236}">
-                <a16:creationId xmlns="" xmlns:a16="http://schemas.microsoft.com/office/drawing/2014/main" id="{F11A34E2-CF14-4FAC-9913-4CAC796E46FA}"/>
+                <a16:creationId xmlns:a16="http://schemas.microsoft.com/office/drawing/2014/main" xmlns="" id="{F11A34E2-CF14-4FAC-9913-4CAC796E46FA}"/>
               </a:ext>
             </a:extLst>
           </p:cNvPr>
@@ -28816,18 +28813,18 @@
 </file>
 
 <file path=customXml/item1.xml><?xml version="1.0" encoding="utf-8"?>
-<p:properties xmlns:p="http://schemas.microsoft.com/office/2006/metadata/properties" xmlns:xsi="http://www.w3.org/2001/XMLSchema-instance" xmlns:pc="http://schemas.microsoft.com/office/infopath/2007/PartnerControls">
-  <documentManagement/>
-</p:properties>
-</file>
-
-<file path=customXml/item2.xml><?xml version="1.0" encoding="utf-8"?>
 <?mso-contentType ?>
 <FormTemplates xmlns="http://schemas.microsoft.com/sharepoint/v3/contenttype/forms">
   <Display>DocumentLibraryForm</Display>
   <Edit>DocumentLibraryForm</Edit>
   <New>DocumentLibraryForm</New>
 </FormTemplates>
+</file>
+
+<file path=customXml/item2.xml><?xml version="1.0" encoding="utf-8"?>
+<p:properties xmlns:p="http://schemas.microsoft.com/office/2006/metadata/properties" xmlns:xsi="http://www.w3.org/2001/XMLSchema-instance" xmlns:pc="http://schemas.microsoft.com/office/infopath/2007/PartnerControls">
+  <documentManagement/>
+</p:properties>
 </file>
 
 <file path=customXml/item3.xml><?xml version="1.0" encoding="utf-8"?>
@@ -28979,6 +28976,14 @@
 </file>
 
 <file path=customXml/itemProps1.xml><?xml version="1.0" encoding="utf-8"?>
+<ds:datastoreItem xmlns:ds="http://schemas.openxmlformats.org/officeDocument/2006/customXml" ds:itemID="{32028EF8-D63B-42F2-9729-538DFDBCE111}">
+  <ds:schemaRefs>
+    <ds:schemaRef ds:uri="http://schemas.microsoft.com/sharepoint/v3/contenttype/forms"/>
+  </ds:schemaRefs>
+</ds:datastoreItem>
+</file>
+
+<file path=customXml/itemProps2.xml><?xml version="1.0" encoding="utf-8"?>
 <ds:datastoreItem xmlns:ds="http://schemas.openxmlformats.org/officeDocument/2006/customXml" ds:itemID="{A9495F4B-BFDC-466D-9B0E-24D55C97E4DD}">
   <ds:schemaRefs>
     <ds:schemaRef ds:uri="http://schemas.microsoft.com/office/2006/documentManagement/types"/>
@@ -28990,14 +28995,6 @@
     <ds:schemaRef ds:uri="6e6f0a11-ea51-4914-9041-4a6fcd55b979"/>
     <ds:schemaRef ds:uri="http://www.w3.org/XML/1998/namespace"/>
     <ds:schemaRef ds:uri="http://purl.org/dc/elements/1.1/"/>
-  </ds:schemaRefs>
-</ds:datastoreItem>
-</file>
-
-<file path=customXml/itemProps2.xml><?xml version="1.0" encoding="utf-8"?>
-<ds:datastoreItem xmlns:ds="http://schemas.openxmlformats.org/officeDocument/2006/customXml" ds:itemID="{32028EF8-D63B-42F2-9729-538DFDBCE111}">
-  <ds:schemaRefs>
-    <ds:schemaRef ds:uri="http://schemas.microsoft.com/sharepoint/v3/contenttype/forms"/>
   </ds:schemaRefs>
 </ds:datastoreItem>
 </file>

</xml_diff>